<commit_message>
Progress 2 Ppt, accepted file
</commit_message>
<xml_diff>
--- a/Dr. E Nduati, Superviser/Submissions/ENC222-0149_2017_OKOMO_JACOB_1234_Progress_2.pptx
+++ b/Dr. E Nduati, Superviser/Submissions/ENC222-0149_2017_OKOMO_JACOB_1234_Progress_2.pptx
@@ -2929,7 +2929,7 @@
                 <a:ea typeface="Verdana" panose="020B0604030504040204" pitchFamily="34" charset="0"/>
                 <a:cs typeface="Verdana" panose="020B0604030504040204" pitchFamily="34" charset="0"/>
               </a:rPr>
-              <a:t>21-Oct-21</a:t>
+              <a:t>1-Nov-21</a:t>
             </a:fld>
             <a:endParaRPr lang="de-DE" sz="1000" dirty="0">
               <a:solidFill>
@@ -5019,7 +5019,7 @@
           <a:p>
             <a:fld id="{440D235E-7DEE-46BF-B2F8-FEE76BCCEBEE}" type="datetimeFigureOut">
               <a:rPr lang="en-US" smtClean="0"/>
-              <a:t>10/21/2021</a:t>
+              <a:t>11/1/2021</a:t>
             </a:fld>
             <a:endParaRPr lang="en-US"/>
           </a:p>
@@ -5217,7 +5217,7 @@
           <a:p>
             <a:fld id="{440D235E-7DEE-46BF-B2F8-FEE76BCCEBEE}" type="datetimeFigureOut">
               <a:rPr lang="en-US" smtClean="0"/>
-              <a:t>10/21/2021</a:t>
+              <a:t>11/1/2021</a:t>
             </a:fld>
             <a:endParaRPr lang="en-US"/>
           </a:p>
@@ -5492,7 +5492,7 @@
           <a:p>
             <a:fld id="{440D235E-7DEE-46BF-B2F8-FEE76BCCEBEE}" type="datetimeFigureOut">
               <a:rPr lang="en-US" smtClean="0"/>
-              <a:t>10/21/2021</a:t>
+              <a:t>11/1/2021</a:t>
             </a:fld>
             <a:endParaRPr lang="en-US"/>
           </a:p>
@@ -5924,7 +5924,7 @@
           <a:p>
             <a:fld id="{440D235E-7DEE-46BF-B2F8-FEE76BCCEBEE}" type="datetimeFigureOut">
               <a:rPr lang="en-US" smtClean="0"/>
-              <a:t>10/21/2021</a:t>
+              <a:t>11/1/2021</a:t>
             </a:fld>
             <a:endParaRPr lang="en-US"/>
           </a:p>
@@ -6336,7 +6336,7 @@
           <a:p>
             <a:fld id="{440D235E-7DEE-46BF-B2F8-FEE76BCCEBEE}" type="datetimeFigureOut">
               <a:rPr lang="en-US" smtClean="0"/>
-              <a:t>10/21/2021</a:t>
+              <a:t>11/1/2021</a:t>
             </a:fld>
             <a:endParaRPr lang="en-US"/>
           </a:p>
@@ -6477,7 +6477,7 @@
           <a:p>
             <a:fld id="{440D235E-7DEE-46BF-B2F8-FEE76BCCEBEE}" type="datetimeFigureOut">
               <a:rPr lang="en-US" smtClean="0"/>
-              <a:t>10/21/2021</a:t>
+              <a:t>11/1/2021</a:t>
             </a:fld>
             <a:endParaRPr lang="en-US"/>
           </a:p>
@@ -6590,7 +6590,7 @@
           <a:p>
             <a:fld id="{440D235E-7DEE-46BF-B2F8-FEE76BCCEBEE}" type="datetimeFigureOut">
               <a:rPr lang="en-US" smtClean="0"/>
-              <a:t>10/21/2021</a:t>
+              <a:t>11/1/2021</a:t>
             </a:fld>
             <a:endParaRPr lang="en-US"/>
           </a:p>
@@ -6901,7 +6901,7 @@
           <a:p>
             <a:fld id="{440D235E-7DEE-46BF-B2F8-FEE76BCCEBEE}" type="datetimeFigureOut">
               <a:rPr lang="en-US" smtClean="0"/>
-              <a:t>10/21/2021</a:t>
+              <a:t>11/1/2021</a:t>
             </a:fld>
             <a:endParaRPr lang="en-US"/>
           </a:p>
@@ -7189,7 +7189,7 @@
           <a:p>
             <a:fld id="{440D235E-7DEE-46BF-B2F8-FEE76BCCEBEE}" type="datetimeFigureOut">
               <a:rPr lang="en-US" smtClean="0"/>
-              <a:t>10/21/2021</a:t>
+              <a:t>11/1/2021</a:t>
             </a:fld>
             <a:endParaRPr lang="en-US"/>
           </a:p>
@@ -7387,7 +7387,7 @@
           <a:p>
             <a:fld id="{440D235E-7DEE-46BF-B2F8-FEE76BCCEBEE}" type="datetimeFigureOut">
               <a:rPr lang="en-US" smtClean="0"/>
-              <a:t>10/21/2021</a:t>
+              <a:t>11/1/2021</a:t>
             </a:fld>
             <a:endParaRPr lang="en-US"/>
           </a:p>
@@ -7595,7 +7595,7 @@
           <a:p>
             <a:fld id="{440D235E-7DEE-46BF-B2F8-FEE76BCCEBEE}" type="datetimeFigureOut">
               <a:rPr lang="en-US" smtClean="0"/>
-              <a:t>10/21/2021</a:t>
+              <a:t>11/1/2021</a:t>
             </a:fld>
             <a:endParaRPr lang="en-US"/>
           </a:p>
@@ -10337,7 +10337,7 @@
           <a:p>
             <a:fld id="{440D235E-7DEE-46BF-B2F8-FEE76BCCEBEE}" type="datetimeFigureOut">
               <a:rPr lang="en-US" smtClean="0"/>
-              <a:t>10/21/2021</a:t>
+              <a:t>11/1/2021</a:t>
             </a:fld>
             <a:endParaRPr lang="en-US"/>
           </a:p>

</xml_diff>

<commit_message>
Final submissions :green_heart:, went well
</commit_message>
<xml_diff>
--- a/Dr. E Nduati, Superviser/Submissions/ENC222-0149_2017_OKOMO_JACOB_1234_Progress_2.pptx
+++ b/Dr. E Nduati, Superviser/Submissions/ENC222-0149_2017_OKOMO_JACOB_1234_Progress_2.pptx
@@ -6,10 +6,10 @@
     <p:sldMasterId id="2147483698" r:id="rId2"/>
   </p:sldMasterIdLst>
   <p:notesMasterIdLst>
-    <p:notesMasterId r:id="rId17"/>
+    <p:notesMasterId r:id="rId19"/>
   </p:notesMasterIdLst>
   <p:handoutMasterIdLst>
-    <p:handoutMasterId r:id="rId18"/>
+    <p:handoutMasterId r:id="rId20"/>
   </p:handoutMasterIdLst>
   <p:sldIdLst>
     <p:sldId id="353" r:id="rId3"/>
@@ -25,7 +25,9 @@
     <p:sldId id="371" r:id="rId13"/>
     <p:sldId id="378" r:id="rId14"/>
     <p:sldId id="376" r:id="rId15"/>
-    <p:sldId id="324" r:id="rId16"/>
+    <p:sldId id="380" r:id="rId16"/>
+    <p:sldId id="354" r:id="rId17"/>
+    <p:sldId id="324" r:id="rId18"/>
   </p:sldIdLst>
   <p:sldSz cx="9144000" cy="6858000" type="screen4x3"/>
   <p:notesSz cx="6858000" cy="9947275"/>
@@ -2460,6 +2462,150 @@
 </p:notes>
 </file>
 
+<file path=ppt/notesSlides/notesSlide3.xml><?xml version="1.0" encoding="utf-8"?>
+<p:notes xmlns:a="http://schemas.openxmlformats.org/drawingml/2006/main" xmlns:r="http://schemas.openxmlformats.org/officeDocument/2006/relationships" xmlns:p="http://schemas.openxmlformats.org/presentationml/2006/main">
+  <p:cSld>
+    <p:spTree>
+      <p:nvGrpSpPr>
+        <p:cNvPr id="1" name=""/>
+        <p:cNvGrpSpPr/>
+        <p:nvPr/>
+      </p:nvGrpSpPr>
+      <p:grpSpPr>
+        <a:xfrm>
+          <a:off x="0" y="0"/>
+          <a:ext cx="0" cy="0"/>
+          <a:chOff x="0" y="0"/>
+          <a:chExt cx="0" cy="0"/>
+        </a:xfrm>
+      </p:grpSpPr>
+      <p:sp>
+        <p:nvSpPr>
+          <p:cNvPr id="2" name="Slide Image Placeholder 1"/>
+          <p:cNvSpPr>
+            <a:spLocks noGrp="1" noRot="1" noChangeAspect="1"/>
+          </p:cNvSpPr>
+          <p:nvPr>
+            <p:ph type="sldImg"/>
+          </p:nvPr>
+        </p:nvSpPr>
+        <p:spPr/>
+      </p:sp>
+      <p:sp>
+        <p:nvSpPr>
+          <p:cNvPr id="3" name="Notes Placeholder 2"/>
+          <p:cNvSpPr>
+            <a:spLocks noGrp="1"/>
+          </p:cNvSpPr>
+          <p:nvPr>
+            <p:ph type="body" idx="1"/>
+          </p:nvPr>
+        </p:nvSpPr>
+        <p:spPr/>
+        <p:txBody>
+          <a:bodyPr/>
+          <a:lstStyle/>
+          <a:p>
+            <a:endParaRPr lang="en-US" dirty="0"/>
+          </a:p>
+        </p:txBody>
+      </p:sp>
+      <p:sp>
+        <p:nvSpPr>
+          <p:cNvPr id="4" name="Date Placeholder 3"/>
+          <p:cNvSpPr>
+            <a:spLocks noGrp="1"/>
+          </p:cNvSpPr>
+          <p:nvPr>
+            <p:ph type="dt"/>
+          </p:nvPr>
+        </p:nvSpPr>
+        <p:spPr/>
+        <p:txBody>
+          <a:bodyPr/>
+          <a:lstStyle/>
+          <a:p>
+            <a:pPr>
+              <a:defRPr/>
+            </a:pPr>
+            <a:r>
+              <a:rPr lang="en-GB"/>
+              <a:t>November 19, 2007</a:t>
+            </a:r>
+          </a:p>
+        </p:txBody>
+      </p:sp>
+      <p:sp>
+        <p:nvSpPr>
+          <p:cNvPr id="5" name="Footer Placeholder 4"/>
+          <p:cNvSpPr>
+            <a:spLocks noGrp="1"/>
+          </p:cNvSpPr>
+          <p:nvPr>
+            <p:ph type="ftr"/>
+          </p:nvPr>
+        </p:nvSpPr>
+        <p:spPr/>
+        <p:txBody>
+          <a:bodyPr/>
+          <a:lstStyle/>
+          <a:p>
+            <a:pPr>
+              <a:defRPr/>
+            </a:pPr>
+            <a:r>
+              <a:rPr lang="en-GB"/>
+              <a:t>|  </a:t>
+            </a:r>
+          </a:p>
+        </p:txBody>
+      </p:sp>
+      <p:sp>
+        <p:nvSpPr>
+          <p:cNvPr id="6" name="Slide Number Placeholder 5"/>
+          <p:cNvSpPr>
+            <a:spLocks noGrp="1"/>
+          </p:cNvSpPr>
+          <p:nvPr>
+            <p:ph type="sldNum"/>
+          </p:nvPr>
+        </p:nvSpPr>
+        <p:spPr/>
+        <p:txBody>
+          <a:bodyPr/>
+          <a:lstStyle/>
+          <a:p>
+            <a:pPr>
+              <a:defRPr/>
+            </a:pPr>
+            <a:r>
+              <a:rPr lang="en-GB"/>
+              <a:t>|  </a:t>
+            </a:r>
+            <a:fld id="{92C156F3-6C7D-4C62-B24F-CEC351458306}" type="slidenum">
+              <a:rPr lang="en-GB" smtClean="0"/>
+              <a:pPr>
+                <a:defRPr/>
+              </a:pPr>
+              <a:t>9</a:t>
+            </a:fld>
+            <a:endParaRPr lang="en-GB"/>
+          </a:p>
+        </p:txBody>
+      </p:sp>
+    </p:spTree>
+    <p:extLst>
+      <p:ext uri="{BB962C8B-B14F-4D97-AF65-F5344CB8AC3E}">
+        <p14:creationId xmlns:p14="http://schemas.microsoft.com/office/powerpoint/2010/main" val="477891807"/>
+      </p:ext>
+    </p:extLst>
+  </p:cSld>
+  <p:clrMapOvr>
+    <a:masterClrMapping/>
+  </p:clrMapOvr>
+</p:notes>
+</file>
+
 <file path=ppt/slideLayouts/slideLayout1.xml><?xml version="1.0" encoding="utf-8"?>
 <p:sldLayout xmlns:a="http://schemas.openxmlformats.org/drawingml/2006/main" xmlns:r="http://schemas.openxmlformats.org/officeDocument/2006/relationships" xmlns:p="http://schemas.openxmlformats.org/presentationml/2006/main" showMasterSp="0" preserve="1" userDrawn="1">
   <p:cSld name="Title Template">
@@ -2929,7 +3075,7 @@
                 <a:ea typeface="Verdana" panose="020B0604030504040204" pitchFamily="34" charset="0"/>
                 <a:cs typeface="Verdana" panose="020B0604030504040204" pitchFamily="34" charset="0"/>
               </a:rPr>
-              <a:t>1-Nov-21</a:t>
+              <a:t>27-Nov-21</a:t>
             </a:fld>
             <a:endParaRPr lang="de-DE" sz="1000" dirty="0">
               <a:solidFill>
@@ -5019,7 +5165,7 @@
           <a:p>
             <a:fld id="{440D235E-7DEE-46BF-B2F8-FEE76BCCEBEE}" type="datetimeFigureOut">
               <a:rPr lang="en-US" smtClean="0"/>
-              <a:t>11/1/2021</a:t>
+              <a:t>11/27/2021</a:t>
             </a:fld>
             <a:endParaRPr lang="en-US"/>
           </a:p>
@@ -5217,7 +5363,7 @@
           <a:p>
             <a:fld id="{440D235E-7DEE-46BF-B2F8-FEE76BCCEBEE}" type="datetimeFigureOut">
               <a:rPr lang="en-US" smtClean="0"/>
-              <a:t>11/1/2021</a:t>
+              <a:t>11/27/2021</a:t>
             </a:fld>
             <a:endParaRPr lang="en-US"/>
           </a:p>
@@ -5492,7 +5638,7 @@
           <a:p>
             <a:fld id="{440D235E-7DEE-46BF-B2F8-FEE76BCCEBEE}" type="datetimeFigureOut">
               <a:rPr lang="en-US" smtClean="0"/>
-              <a:t>11/1/2021</a:t>
+              <a:t>11/27/2021</a:t>
             </a:fld>
             <a:endParaRPr lang="en-US"/>
           </a:p>
@@ -5924,7 +6070,7 @@
           <a:p>
             <a:fld id="{440D235E-7DEE-46BF-B2F8-FEE76BCCEBEE}" type="datetimeFigureOut">
               <a:rPr lang="en-US" smtClean="0"/>
-              <a:t>11/1/2021</a:t>
+              <a:t>11/27/2021</a:t>
             </a:fld>
             <a:endParaRPr lang="en-US"/>
           </a:p>
@@ -6336,7 +6482,7 @@
           <a:p>
             <a:fld id="{440D235E-7DEE-46BF-B2F8-FEE76BCCEBEE}" type="datetimeFigureOut">
               <a:rPr lang="en-US" smtClean="0"/>
-              <a:t>11/1/2021</a:t>
+              <a:t>11/27/2021</a:t>
             </a:fld>
             <a:endParaRPr lang="en-US"/>
           </a:p>
@@ -6477,7 +6623,7 @@
           <a:p>
             <a:fld id="{440D235E-7DEE-46BF-B2F8-FEE76BCCEBEE}" type="datetimeFigureOut">
               <a:rPr lang="en-US" smtClean="0"/>
-              <a:t>11/1/2021</a:t>
+              <a:t>11/27/2021</a:t>
             </a:fld>
             <a:endParaRPr lang="en-US"/>
           </a:p>
@@ -6590,7 +6736,7 @@
           <a:p>
             <a:fld id="{440D235E-7DEE-46BF-B2F8-FEE76BCCEBEE}" type="datetimeFigureOut">
               <a:rPr lang="en-US" smtClean="0"/>
-              <a:t>11/1/2021</a:t>
+              <a:t>11/27/2021</a:t>
             </a:fld>
             <a:endParaRPr lang="en-US"/>
           </a:p>
@@ -6901,7 +7047,7 @@
           <a:p>
             <a:fld id="{440D235E-7DEE-46BF-B2F8-FEE76BCCEBEE}" type="datetimeFigureOut">
               <a:rPr lang="en-US" smtClean="0"/>
-              <a:t>11/1/2021</a:t>
+              <a:t>11/27/2021</a:t>
             </a:fld>
             <a:endParaRPr lang="en-US"/>
           </a:p>
@@ -7189,7 +7335,7 @@
           <a:p>
             <a:fld id="{440D235E-7DEE-46BF-B2F8-FEE76BCCEBEE}" type="datetimeFigureOut">
               <a:rPr lang="en-US" smtClean="0"/>
-              <a:t>11/1/2021</a:t>
+              <a:t>11/27/2021</a:t>
             </a:fld>
             <a:endParaRPr lang="en-US"/>
           </a:p>
@@ -7387,7 +7533,7 @@
           <a:p>
             <a:fld id="{440D235E-7DEE-46BF-B2F8-FEE76BCCEBEE}" type="datetimeFigureOut">
               <a:rPr lang="en-US" smtClean="0"/>
-              <a:t>11/1/2021</a:t>
+              <a:t>11/27/2021</a:t>
             </a:fld>
             <a:endParaRPr lang="en-US"/>
           </a:p>
@@ -7595,7 +7741,7 @@
           <a:p>
             <a:fld id="{440D235E-7DEE-46BF-B2F8-FEE76BCCEBEE}" type="datetimeFigureOut">
               <a:rPr lang="en-US" smtClean="0"/>
-              <a:t>11/1/2021</a:t>
+              <a:t>11/27/2021</a:t>
             </a:fld>
             <a:endParaRPr lang="en-US"/>
           </a:p>
@@ -10337,7 +10483,7 @@
           <a:p>
             <a:fld id="{440D235E-7DEE-46BF-B2F8-FEE76BCCEBEE}" type="datetimeFigureOut">
               <a:rPr lang="en-US" smtClean="0"/>
-              <a:t>11/1/2021</a:t>
+              <a:t>11/27/2021</a:t>
             </a:fld>
             <a:endParaRPr lang="en-US"/>
           </a:p>
@@ -11477,7 +11623,7 @@
                 <a:ea typeface="Verdana" panose="020B0604030504040204" pitchFamily="34" charset="0"/>
                 <a:cs typeface="Verdana" panose="020B0604030504040204" pitchFamily="34" charset="0"/>
               </a:rPr>
-              <a:t>Progress Presentation</a:t>
+              <a:t>Final Presentation</a:t>
             </a:r>
           </a:p>
         </p:txBody>
@@ -11575,185 +11721,6 @@
           </a:p>
         </p:txBody>
       </p:sp>
-      <p:pic>
-        <p:nvPicPr>
-          <p:cNvPr id="9" name="Picture 8">
-            <a:extLst>
-              <a:ext uri="{FF2B5EF4-FFF2-40B4-BE49-F238E27FC236}">
-                <a16:creationId xmlns:a16="http://schemas.microsoft.com/office/drawing/2014/main" id="{8EF40F3B-7B45-4AF5-A1B1-9E1581303764}"/>
-              </a:ext>
-            </a:extLst>
-          </p:cNvPr>
-          <p:cNvPicPr>
-            <a:picLocks noChangeAspect="1"/>
-          </p:cNvPicPr>
-          <p:nvPr/>
-        </p:nvPicPr>
-        <p:blipFill>
-          <a:blip r:embed="rId2">
-            <a:extLst>
-              <a:ext uri="{28A0092B-C50C-407E-A947-70E740481C1C}">
-                <a14:useLocalDpi xmlns:a14="http://schemas.microsoft.com/office/drawing/2010/main" val="0"/>
-              </a:ext>
-            </a:extLst>
-          </a:blip>
-          <a:stretch>
-            <a:fillRect/>
-          </a:stretch>
-        </p:blipFill>
-        <p:spPr>
-          <a:xfrm>
-            <a:off x="31975" y="1795438"/>
-            <a:ext cx="5096321" cy="3589536"/>
-          </a:xfrm>
-          <a:prstGeom prst="rect">
-            <a:avLst/>
-          </a:prstGeom>
-        </p:spPr>
-      </p:pic>
-      <p:sp>
-        <p:nvSpPr>
-          <p:cNvPr id="10" name="Text Box 2">
-            <a:extLst>
-              <a:ext uri="{FF2B5EF4-FFF2-40B4-BE49-F238E27FC236}">
-                <a16:creationId xmlns:a16="http://schemas.microsoft.com/office/drawing/2014/main" id="{D1A9DDB1-8901-49C2-80B3-E0E3E48BFF76}"/>
-              </a:ext>
-            </a:extLst>
-          </p:cNvPr>
-          <p:cNvSpPr txBox="1">
-            <a:spLocks noChangeArrowheads="1"/>
-          </p:cNvSpPr>
-          <p:nvPr/>
-        </p:nvSpPr>
-        <p:spPr bwMode="auto">
-          <a:xfrm>
-            <a:off x="539552" y="2204864"/>
-            <a:ext cx="1224136" cy="360040"/>
-          </a:xfrm>
-          <a:prstGeom prst="rect">
-            <a:avLst/>
-          </a:prstGeom>
-          <a:solidFill>
-            <a:srgbClr val="FFFFFF"/>
-          </a:solidFill>
-          <a:ln w="9525">
-            <a:solidFill>
-              <a:schemeClr val="bg1"/>
-            </a:solidFill>
-            <a:miter lim="800000"/>
-            <a:headEnd/>
-            <a:tailEnd/>
-          </a:ln>
-        </p:spPr>
-        <p:txBody>
-          <a:bodyPr rot="0" vert="horz" wrap="square" lIns="91440" tIns="45720" rIns="91440" bIns="45720" anchor="t" anchorCtr="0">
-            <a:noAutofit/>
-          </a:bodyPr>
-          <a:lstStyle/>
-          <a:p>
-            <a:pPr marL="0" marR="0" algn="l">
-              <a:lnSpc>
-                <a:spcPct val="150000"/>
-              </a:lnSpc>
-              <a:spcBef>
-                <a:spcPts val="0"/>
-              </a:spcBef>
-              <a:spcAft>
-                <a:spcPts val="800"/>
-              </a:spcAft>
-            </a:pPr>
-            <a:r>
-              <a:rPr lang="en-US" sz="1100" dirty="0">
-                <a:solidFill>
-                  <a:srgbClr val="000000"/>
-                </a:solidFill>
-                <a:effectLst/>
-                <a:latin typeface="Verdana" panose="020B0604030504040204" pitchFamily="34" charset="0"/>
-                <a:ea typeface="Calibri" panose="020F0502020204030204" pitchFamily="34" charset="0"/>
-                <a:cs typeface="Times New Roman" panose="02020603050405020304" pitchFamily="18" charset="0"/>
-              </a:rPr>
-              <a:t>R = </a:t>
-            </a:r>
-            <a:r>
-              <a:rPr lang="en-US" sz="1100" dirty="0">
-                <a:solidFill>
-                  <a:srgbClr val="000000"/>
-                </a:solidFill>
-                <a:effectLst/>
-                <a:latin typeface="Segoe UI" panose="020B0502040204020203" pitchFamily="34" charset="0"/>
-                <a:ea typeface="Times New Roman" panose="02020603050405020304" pitchFamily="18" charset="0"/>
-                <a:cs typeface="Times New Roman" panose="02020603050405020304" pitchFamily="18" charset="0"/>
-              </a:rPr>
-              <a:t>0.847751</a:t>
-            </a:r>
-            <a:endParaRPr lang="en-US" sz="1100" dirty="0">
-              <a:effectLst/>
-              <a:latin typeface="Verdana" panose="020B0604030504040204" pitchFamily="34" charset="0"/>
-              <a:ea typeface="Calibri" panose="020F0502020204030204" pitchFamily="34" charset="0"/>
-              <a:cs typeface="Times New Roman" panose="02020603050405020304" pitchFamily="18" charset="0"/>
-            </a:endParaRPr>
-          </a:p>
-          <a:p>
-            <a:pPr marL="0" marR="0" algn="l">
-              <a:lnSpc>
-                <a:spcPct val="150000"/>
-              </a:lnSpc>
-              <a:spcBef>
-                <a:spcPts val="0"/>
-              </a:spcBef>
-              <a:spcAft>
-                <a:spcPts val="800"/>
-              </a:spcAft>
-            </a:pPr>
-            <a:r>
-              <a:rPr lang="en-US" sz="800" dirty="0">
-                <a:solidFill>
-                  <a:srgbClr val="000000"/>
-                </a:solidFill>
-                <a:effectLst/>
-                <a:latin typeface="Segoe UI" panose="020B0502040204020203" pitchFamily="34" charset="0"/>
-                <a:ea typeface="Times New Roman" panose="02020603050405020304" pitchFamily="18" charset="0"/>
-                <a:cs typeface="Times New Roman" panose="02020603050405020304" pitchFamily="18" charset="0"/>
-              </a:rPr>
-              <a:t> </a:t>
-            </a:r>
-            <a:endParaRPr lang="en-US" sz="1100" dirty="0">
-              <a:effectLst/>
-              <a:latin typeface="Verdana" panose="020B0604030504040204" pitchFamily="34" charset="0"/>
-              <a:ea typeface="Calibri" panose="020F0502020204030204" pitchFamily="34" charset="0"/>
-              <a:cs typeface="Times New Roman" panose="02020603050405020304" pitchFamily="18" charset="0"/>
-            </a:endParaRPr>
-          </a:p>
-          <a:p>
-            <a:pPr marL="0" marR="0" algn="l">
-              <a:lnSpc>
-                <a:spcPct val="150000"/>
-              </a:lnSpc>
-              <a:spcBef>
-                <a:spcPts val="0"/>
-              </a:spcBef>
-              <a:spcAft>
-                <a:spcPts val="800"/>
-              </a:spcAft>
-            </a:pPr>
-            <a:r>
-              <a:rPr lang="en-US" sz="800" dirty="0">
-                <a:effectLst/>
-                <a:latin typeface="Verdana" panose="020B0604030504040204" pitchFamily="34" charset="0"/>
-                <a:ea typeface="Calibri" panose="020F0502020204030204" pitchFamily="34" charset="0"/>
-                <a:cs typeface="Times New Roman" panose="02020603050405020304" pitchFamily="18" charset="0"/>
-              </a:rPr>
-              <a:t> </a:t>
-            </a:r>
-            <a:endParaRPr lang="en-US" sz="1100" dirty="0">
-              <a:effectLst/>
-              <a:latin typeface="Verdana" panose="020B0604030504040204" pitchFamily="34" charset="0"/>
-              <a:ea typeface="Calibri" panose="020F0502020204030204" pitchFamily="34" charset="0"/>
-              <a:cs typeface="Times New Roman" panose="02020603050405020304" pitchFamily="18" charset="0"/>
-            </a:endParaRPr>
-          </a:p>
-        </p:txBody>
-      </p:sp>
       <p:graphicFrame>
         <p:nvGraphicFramePr>
           <p:cNvPr id="11" name="Table 11">
@@ -11769,14 +11736,14 @@
           <p:nvPr>
             <p:extLst>
               <p:ext uri="{D42A27DB-BD31-4B8C-83A1-F6EECF244321}">
-                <p14:modId xmlns:p14="http://schemas.microsoft.com/office/powerpoint/2010/main" val="3763706422"/>
+                <p14:modId xmlns:p14="http://schemas.microsoft.com/office/powerpoint/2010/main" val="2758908029"/>
               </p:ext>
             </p:extLst>
           </p:nvPr>
         </p:nvGraphicFramePr>
         <p:xfrm>
-          <a:off x="5102428" y="1988840"/>
-          <a:ext cx="3790052" cy="3096345"/>
+          <a:off x="6119813" y="1454667"/>
+          <a:ext cx="3024187" cy="3528392"/>
         </p:xfrm>
         <a:graphic>
           <a:graphicData uri="http://schemas.openxmlformats.org/drawingml/2006/table">
@@ -11785,14 +11752,14 @@
                 <a:tableStyleId>{00A15C55-8517-42AA-B614-E9B94910E393}</a:tableStyleId>
               </a:tblPr>
               <a:tblGrid>
-                <a:gridCol w="981740">
+                <a:gridCol w="756443">
                   <a:extLst>
                     <a:ext uri="{9D8B030D-6E8A-4147-A177-3AD203B41FA5}">
                       <a16:colId xmlns:a16="http://schemas.microsoft.com/office/drawing/2014/main" val="2239991187"/>
                     </a:ext>
                   </a:extLst>
                 </a:gridCol>
-                <a:gridCol w="2808312">
+                <a:gridCol w="2267744">
                   <a:extLst>
                     <a:ext uri="{9D8B030D-6E8A-4147-A177-3AD203B41FA5}">
                       <a16:colId xmlns:a16="http://schemas.microsoft.com/office/drawing/2014/main" val="1677367209"/>
@@ -11800,7 +11767,7 @@
                   </a:extLst>
                 </a:gridCol>
               </a:tblGrid>
-              <a:tr h="442335">
+              <a:tr h="504056">
                 <a:tc>
                   <a:txBody>
                     <a:bodyPr/>
@@ -11821,7 +11788,7 @@
                     <a:p>
                       <a:r>
                         <a:rPr lang="en-US" dirty="0"/>
-                        <a:t>Correlation Co-efficient</a:t>
+                        <a:t>Correlation Co-eff’</a:t>
                       </a:r>
                     </a:p>
                   </a:txBody>
@@ -11833,7 +11800,7 @@
                   </a:ext>
                 </a:extLst>
               </a:tr>
-              <a:tr h="442335">
+              <a:tr h="504056">
                 <a:tc>
                   <a:txBody>
                     <a:bodyPr/>
@@ -11859,7 +11826,7 @@
                           </a:solidFill>
                           <a:effectLst/>
                         </a:rPr>
-                        <a:t>0.847751</a:t>
+                        <a:t>0.836884</a:t>
                       </a:r>
                       <a:endParaRPr lang="en-US" dirty="0"/>
                     </a:p>
@@ -11872,7 +11839,7 @@
                   </a:ext>
                 </a:extLst>
               </a:tr>
-              <a:tr h="442335">
+              <a:tr h="504056">
                 <a:tc>
                   <a:txBody>
                     <a:bodyPr/>
@@ -11936,7 +11903,7 @@
                   </a:ext>
                 </a:extLst>
               </a:tr>
-              <a:tr h="442335">
+              <a:tr h="504056">
                 <a:tc>
                   <a:txBody>
                     <a:bodyPr/>
@@ -11979,7 +11946,7 @@
                   </a:ext>
                 </a:extLst>
               </a:tr>
-              <a:tr h="442335">
+              <a:tr h="504056">
                 <a:tc>
                   <a:txBody>
                     <a:bodyPr/>
@@ -12043,7 +12010,7 @@
                   </a:ext>
                 </a:extLst>
               </a:tr>
-              <a:tr h="442335">
+              <a:tr h="504056">
                 <a:tc>
                   <a:txBody>
                     <a:bodyPr/>
@@ -12082,7 +12049,7 @@
                   </a:ext>
                 </a:extLst>
               </a:tr>
-              <a:tr h="442335">
+              <a:tr h="504056">
                 <a:tc>
                   <a:txBody>
                     <a:bodyPr/>
@@ -12129,6 +12096,123 @@
           </a:graphicData>
         </a:graphic>
       </p:graphicFrame>
+      <p:pic>
+        <p:nvPicPr>
+          <p:cNvPr id="8" name="Picture 7">
+            <a:extLst>
+              <a:ext uri="{FF2B5EF4-FFF2-40B4-BE49-F238E27FC236}">
+                <a16:creationId xmlns:a16="http://schemas.microsoft.com/office/drawing/2014/main" id="{7209C4B4-0DB8-4DF6-B55D-9720BE1B0047}"/>
+              </a:ext>
+            </a:extLst>
+          </p:cNvPr>
+          <p:cNvPicPr>
+            <a:picLocks noChangeAspect="1"/>
+          </p:cNvPicPr>
+          <p:nvPr/>
+        </p:nvPicPr>
+        <p:blipFill>
+          <a:blip r:embed="rId2">
+            <a:extLst>
+              <a:ext uri="{28A0092B-C50C-407E-A947-70E740481C1C}">
+                <a14:useLocalDpi xmlns:a14="http://schemas.microsoft.com/office/drawing/2010/main" val="0"/>
+              </a:ext>
+            </a:extLst>
+          </a:blip>
+          <a:stretch>
+            <a:fillRect/>
+          </a:stretch>
+        </p:blipFill>
+        <p:spPr>
+          <a:xfrm>
+            <a:off x="75972" y="1484784"/>
+            <a:ext cx="5988374" cy="3744416"/>
+          </a:xfrm>
+          <a:prstGeom prst="rect">
+            <a:avLst/>
+          </a:prstGeom>
+        </p:spPr>
+      </p:pic>
+      <p:sp>
+        <p:nvSpPr>
+          <p:cNvPr id="12" name="Text Box 2">
+            <a:extLst>
+              <a:ext uri="{FF2B5EF4-FFF2-40B4-BE49-F238E27FC236}">
+                <a16:creationId xmlns:a16="http://schemas.microsoft.com/office/drawing/2014/main" id="{D13E697A-F9BA-4C74-B257-12A0FBC5531C}"/>
+              </a:ext>
+            </a:extLst>
+          </p:cNvPr>
+          <p:cNvSpPr txBox="1">
+            <a:spLocks noChangeArrowheads="1"/>
+          </p:cNvSpPr>
+          <p:nvPr/>
+        </p:nvSpPr>
+        <p:spPr bwMode="auto">
+          <a:xfrm>
+            <a:off x="971601" y="2060848"/>
+            <a:ext cx="1080120" cy="370247"/>
+          </a:xfrm>
+          <a:prstGeom prst="rect">
+            <a:avLst/>
+          </a:prstGeom>
+          <a:solidFill>
+            <a:srgbClr val="FFFFFF"/>
+          </a:solidFill>
+          <a:ln w="9525">
+            <a:solidFill>
+              <a:schemeClr val="bg1"/>
+            </a:solidFill>
+            <a:miter lim="800000"/>
+            <a:headEnd/>
+            <a:tailEnd/>
+          </a:ln>
+        </p:spPr>
+        <p:txBody>
+          <a:bodyPr rot="0" vert="horz" wrap="square" lIns="91440" tIns="45720" rIns="91440" bIns="45720" anchor="t" anchorCtr="0">
+            <a:noAutofit/>
+          </a:bodyPr>
+          <a:lstStyle/>
+          <a:p>
+            <a:pPr marL="0" marR="0" algn="l">
+              <a:lnSpc>
+                <a:spcPct val="150000"/>
+              </a:lnSpc>
+              <a:spcBef>
+                <a:spcPts val="0"/>
+              </a:spcBef>
+              <a:spcAft>
+                <a:spcPts val="800"/>
+              </a:spcAft>
+            </a:pPr>
+            <a:r>
+              <a:rPr lang="en-US" sz="1100" b="1" dirty="0">
+                <a:solidFill>
+                  <a:schemeClr val="tx1">
+                    <a:lumMod val="50000"/>
+                    <a:lumOff val="50000"/>
+                  </a:schemeClr>
+                </a:solidFill>
+                <a:effectLst/>
+                <a:latin typeface="Segoe UI" panose="020B0502040204020203" pitchFamily="34" charset="0"/>
+                <a:ea typeface="Times New Roman" panose="02020603050405020304" pitchFamily="18" charset="0"/>
+                <a:cs typeface="Times New Roman" panose="02020603050405020304" pitchFamily="18" charset="0"/>
+              </a:rPr>
+              <a:t>R = 0.836884</a:t>
+            </a:r>
+            <a:endParaRPr lang="en-US" sz="1100" b="1" dirty="0">
+              <a:solidFill>
+                <a:schemeClr val="tx1">
+                  <a:lumMod val="50000"/>
+                  <a:lumOff val="50000"/>
+                </a:schemeClr>
+              </a:solidFill>
+              <a:effectLst/>
+              <a:latin typeface="Verdana" panose="020B0604030504040204" pitchFamily="34" charset="0"/>
+              <a:ea typeface="Calibri" panose="020F0502020204030204" pitchFamily="34" charset="0"/>
+              <a:cs typeface="Times New Roman" panose="02020603050405020304" pitchFamily="18" charset="0"/>
+            </a:endParaRPr>
+          </a:p>
+        </p:txBody>
+      </p:sp>
     </p:spTree>
     <p:extLst>
       <p:ext uri="{BB962C8B-B14F-4D97-AF65-F5344CB8AC3E}">
@@ -12193,150 +12277,6 @@
           </a:p>
         </p:txBody>
       </p:sp>
-      <p:pic>
-        <p:nvPicPr>
-          <p:cNvPr id="8" name="Picture 7">
-            <a:extLst>
-              <a:ext uri="{FF2B5EF4-FFF2-40B4-BE49-F238E27FC236}">
-                <a16:creationId xmlns:a16="http://schemas.microsoft.com/office/drawing/2014/main" id="{50A5A0F9-3C94-4975-B618-F9B68EE5647E}"/>
-              </a:ext>
-            </a:extLst>
-          </p:cNvPr>
-          <p:cNvPicPr>
-            <a:picLocks noChangeAspect="1"/>
-          </p:cNvPicPr>
-          <p:nvPr/>
-        </p:nvPicPr>
-        <p:blipFill>
-          <a:blip r:embed="rId2">
-            <a:extLst>
-              <a:ext uri="{28A0092B-C50C-407E-A947-70E740481C1C}">
-                <a14:useLocalDpi xmlns:a14="http://schemas.microsoft.com/office/drawing/2010/main" val="0"/>
-              </a:ext>
-            </a:extLst>
-          </a:blip>
-          <a:stretch>
-            <a:fillRect/>
-          </a:stretch>
-        </p:blipFill>
-        <p:spPr>
-          <a:xfrm>
-            <a:off x="280522" y="4333724"/>
-            <a:ext cx="4324241" cy="2381772"/>
-          </a:xfrm>
-          <a:prstGeom prst="rect">
-            <a:avLst/>
-          </a:prstGeom>
-        </p:spPr>
-      </p:pic>
-      <p:pic>
-        <p:nvPicPr>
-          <p:cNvPr id="9" name="Picture 8">
-            <a:extLst>
-              <a:ext uri="{FF2B5EF4-FFF2-40B4-BE49-F238E27FC236}">
-                <a16:creationId xmlns:a16="http://schemas.microsoft.com/office/drawing/2014/main" id="{A3FA9703-F7D7-4924-8E27-32261E64E24D}"/>
-              </a:ext>
-            </a:extLst>
-          </p:cNvPr>
-          <p:cNvPicPr>
-            <a:picLocks noChangeAspect="1"/>
-          </p:cNvPicPr>
-          <p:nvPr/>
-        </p:nvPicPr>
-        <p:blipFill>
-          <a:blip r:embed="rId3">
-            <a:extLst>
-              <a:ext uri="{28A0092B-C50C-407E-A947-70E740481C1C}">
-                <a14:useLocalDpi xmlns:a14="http://schemas.microsoft.com/office/drawing/2010/main" val="0"/>
-              </a:ext>
-            </a:extLst>
-          </a:blip>
-          <a:stretch>
-            <a:fillRect/>
-          </a:stretch>
-        </p:blipFill>
-        <p:spPr>
-          <a:xfrm>
-            <a:off x="4850610" y="1748900"/>
-            <a:ext cx="3962400" cy="2308225"/>
-          </a:xfrm>
-          <a:prstGeom prst="rect">
-            <a:avLst/>
-          </a:prstGeom>
-        </p:spPr>
-      </p:pic>
-      <p:pic>
-        <p:nvPicPr>
-          <p:cNvPr id="10" name="Picture 9">
-            <a:extLst>
-              <a:ext uri="{FF2B5EF4-FFF2-40B4-BE49-F238E27FC236}">
-                <a16:creationId xmlns:a16="http://schemas.microsoft.com/office/drawing/2014/main" id="{03CFEC11-FD91-456C-817F-380A096FB453}"/>
-              </a:ext>
-            </a:extLst>
-          </p:cNvPr>
-          <p:cNvPicPr>
-            <a:picLocks noChangeAspect="1"/>
-          </p:cNvPicPr>
-          <p:nvPr/>
-        </p:nvPicPr>
-        <p:blipFill>
-          <a:blip r:embed="rId4">
-            <a:extLst>
-              <a:ext uri="{28A0092B-C50C-407E-A947-70E740481C1C}">
-                <a14:useLocalDpi xmlns:a14="http://schemas.microsoft.com/office/drawing/2010/main" val="0"/>
-              </a:ext>
-            </a:extLst>
-          </a:blip>
-          <a:stretch>
-            <a:fillRect/>
-          </a:stretch>
-        </p:blipFill>
-        <p:spPr>
-          <a:xfrm>
-            <a:off x="426366" y="1748899"/>
-            <a:ext cx="4259145" cy="2308225"/>
-          </a:xfrm>
-          <a:prstGeom prst="rect">
-            <a:avLst/>
-          </a:prstGeom>
-        </p:spPr>
-      </p:pic>
-      <p:pic>
-        <p:nvPicPr>
-          <p:cNvPr id="11" name="Picture 10">
-            <a:extLst>
-              <a:ext uri="{FF2B5EF4-FFF2-40B4-BE49-F238E27FC236}">
-                <a16:creationId xmlns:a16="http://schemas.microsoft.com/office/drawing/2014/main" id="{868D6DF2-DCFC-4B0A-85FF-26F6AFBC961D}"/>
-              </a:ext>
-            </a:extLst>
-          </p:cNvPr>
-          <p:cNvPicPr>
-            <a:picLocks noChangeAspect="1"/>
-          </p:cNvPicPr>
-          <p:nvPr/>
-        </p:nvPicPr>
-        <p:blipFill>
-          <a:blip r:embed="rId5">
-            <a:extLst>
-              <a:ext uri="{28A0092B-C50C-407E-A947-70E740481C1C}">
-                <a14:useLocalDpi xmlns:a14="http://schemas.microsoft.com/office/drawing/2010/main" val="0"/>
-              </a:ext>
-            </a:extLst>
-          </a:blip>
-          <a:stretch>
-            <a:fillRect/>
-          </a:stretch>
-        </p:blipFill>
-        <p:spPr>
-          <a:xfrm>
-            <a:off x="4686029" y="4435764"/>
-            <a:ext cx="4144109" cy="2308224"/>
-          </a:xfrm>
-          <a:prstGeom prst="rect">
-            <a:avLst/>
-          </a:prstGeom>
-        </p:spPr>
-      </p:pic>
       <p:sp>
         <p:nvSpPr>
           <p:cNvPr id="12" name="Text Box 2">
@@ -12612,6 +12552,126 @@
           </a:p>
         </p:txBody>
       </p:sp>
+      <p:pic>
+        <p:nvPicPr>
+          <p:cNvPr id="4" name="Picture 3">
+            <a:extLst>
+              <a:ext uri="{FF2B5EF4-FFF2-40B4-BE49-F238E27FC236}">
+                <a16:creationId xmlns:a16="http://schemas.microsoft.com/office/drawing/2014/main" id="{A51D0C53-F3AC-4835-83D3-1345CDE6C838}"/>
+              </a:ext>
+            </a:extLst>
+          </p:cNvPr>
+          <p:cNvPicPr>
+            <a:picLocks noChangeAspect="1"/>
+          </p:cNvPicPr>
+          <p:nvPr/>
+        </p:nvPicPr>
+        <p:blipFill>
+          <a:blip r:embed="rId2"/>
+          <a:stretch>
+            <a:fillRect/>
+          </a:stretch>
+        </p:blipFill>
+        <p:spPr>
+          <a:xfrm>
+            <a:off x="272085" y="1735922"/>
+            <a:ext cx="4558499" cy="2364537"/>
+          </a:xfrm>
+          <a:prstGeom prst="rect">
+            <a:avLst/>
+          </a:prstGeom>
+        </p:spPr>
+      </p:pic>
+      <p:pic>
+        <p:nvPicPr>
+          <p:cNvPr id="6" name="Picture 5">
+            <a:extLst>
+              <a:ext uri="{FF2B5EF4-FFF2-40B4-BE49-F238E27FC236}">
+                <a16:creationId xmlns:a16="http://schemas.microsoft.com/office/drawing/2014/main" id="{00812875-1B10-4C9B-87E6-E1A86ACFF557}"/>
+              </a:ext>
+            </a:extLst>
+          </p:cNvPr>
+          <p:cNvPicPr>
+            <a:picLocks noChangeAspect="1"/>
+          </p:cNvPicPr>
+          <p:nvPr/>
+        </p:nvPicPr>
+        <p:blipFill>
+          <a:blip r:embed="rId3"/>
+          <a:stretch>
+            <a:fillRect/>
+          </a:stretch>
+        </p:blipFill>
+        <p:spPr>
+          <a:xfrm>
+            <a:off x="4830584" y="1734047"/>
+            <a:ext cx="4123151" cy="2213481"/>
+          </a:xfrm>
+          <a:prstGeom prst="rect">
+            <a:avLst/>
+          </a:prstGeom>
+        </p:spPr>
+      </p:pic>
+      <p:pic>
+        <p:nvPicPr>
+          <p:cNvPr id="14" name="Picture 13">
+            <a:extLst>
+              <a:ext uri="{FF2B5EF4-FFF2-40B4-BE49-F238E27FC236}">
+                <a16:creationId xmlns:a16="http://schemas.microsoft.com/office/drawing/2014/main" id="{5D486743-D8ED-4AA9-9E91-5CB3DF10CF0C}"/>
+              </a:ext>
+            </a:extLst>
+          </p:cNvPr>
+          <p:cNvPicPr>
+            <a:picLocks noChangeAspect="1"/>
+          </p:cNvPicPr>
+          <p:nvPr/>
+        </p:nvPicPr>
+        <p:blipFill>
+          <a:blip r:embed="rId4"/>
+          <a:stretch>
+            <a:fillRect/>
+          </a:stretch>
+        </p:blipFill>
+        <p:spPr>
+          <a:xfrm>
+            <a:off x="272085" y="4389844"/>
+            <a:ext cx="4299915" cy="2298231"/>
+          </a:xfrm>
+          <a:prstGeom prst="rect">
+            <a:avLst/>
+          </a:prstGeom>
+        </p:spPr>
+      </p:pic>
+      <p:pic>
+        <p:nvPicPr>
+          <p:cNvPr id="17" name="Picture 16">
+            <a:extLst>
+              <a:ext uri="{FF2B5EF4-FFF2-40B4-BE49-F238E27FC236}">
+                <a16:creationId xmlns:a16="http://schemas.microsoft.com/office/drawing/2014/main" id="{6DB4E389-6417-4EA7-B896-21AE4199DAD8}"/>
+              </a:ext>
+            </a:extLst>
+          </p:cNvPr>
+          <p:cNvPicPr>
+            <a:picLocks noChangeAspect="1"/>
+          </p:cNvPicPr>
+          <p:nvPr/>
+        </p:nvPicPr>
+        <p:blipFill>
+          <a:blip r:embed="rId5"/>
+          <a:stretch>
+            <a:fillRect/>
+          </a:stretch>
+        </p:blipFill>
+        <p:spPr>
+          <a:xfrm>
+            <a:off x="4642437" y="4363745"/>
+            <a:ext cx="4269709" cy="2303737"/>
+          </a:xfrm>
+          <a:prstGeom prst="rect">
+            <a:avLst/>
+          </a:prstGeom>
+        </p:spPr>
+      </p:pic>
     </p:spTree>
     <p:extLst>
       <p:ext uri="{BB962C8B-B14F-4D97-AF65-F5344CB8AC3E}">
@@ -12724,14 +12784,14 @@
           <p:nvPr>
             <p:extLst>
               <p:ext uri="{D42A27DB-BD31-4B8C-83A1-F6EECF244321}">
-                <p14:modId xmlns:p14="http://schemas.microsoft.com/office/powerpoint/2010/main" val="2908309655"/>
+                <p14:modId xmlns:p14="http://schemas.microsoft.com/office/powerpoint/2010/main" val="9481223"/>
               </p:ext>
             </p:extLst>
           </p:nvPr>
         </p:nvGraphicFramePr>
         <p:xfrm>
-          <a:off x="5652120" y="1520788"/>
-          <a:ext cx="3330044" cy="3816425"/>
+          <a:off x="5868144" y="1473049"/>
+          <a:ext cx="3114019" cy="4129422"/>
         </p:xfrm>
         <a:graphic>
           <a:graphicData uri="http://schemas.openxmlformats.org/drawingml/2006/table">
@@ -12740,14 +12800,14 @@
                 <a:tableStyleId>{00A15C55-8517-42AA-B614-E9B94910E393}</a:tableStyleId>
               </a:tblPr>
               <a:tblGrid>
-                <a:gridCol w="862584">
+                <a:gridCol w="806627">
                   <a:extLst>
                     <a:ext uri="{9D8B030D-6E8A-4147-A177-3AD203B41FA5}">
                       <a16:colId xmlns:a16="http://schemas.microsoft.com/office/drawing/2014/main" val="2239991187"/>
                     </a:ext>
                   </a:extLst>
                 </a:gridCol>
-                <a:gridCol w="2467460">
+                <a:gridCol w="2307392">
                   <a:extLst>
                     <a:ext uri="{9D8B030D-6E8A-4147-A177-3AD203B41FA5}">
                       <a16:colId xmlns:a16="http://schemas.microsoft.com/office/drawing/2014/main" val="1677367209"/>
@@ -12755,7 +12815,7 @@
                   </a:extLst>
                 </a:gridCol>
               </a:tblGrid>
-              <a:tr h="678053">
+              <a:tr h="733662">
                 <a:tc>
                   <a:txBody>
                     <a:bodyPr/>
@@ -12775,12 +12835,8 @@
                     <a:lstStyle/>
                     <a:p>
                       <a:r>
-                        <a:rPr lang="en-US" dirty="0" err="1"/>
-                        <a:t>Correl’n</a:t>
-                      </a:r>
-                      <a:r>
                         <a:rPr lang="en-US" dirty="0"/>
-                        <a:t> Co-efficient</a:t>
+                        <a:t>Correlation Co-eff’</a:t>
                       </a:r>
                     </a:p>
                   </a:txBody>
@@ -12792,7 +12848,7 @@
                   </a:ext>
                 </a:extLst>
               </a:tr>
-              <a:tr h="523062">
+              <a:tr h="565960">
                 <a:tc>
                   <a:txBody>
                     <a:bodyPr/>
@@ -12831,7 +12887,7 @@
                   </a:ext>
                 </a:extLst>
               </a:tr>
-              <a:tr h="523062">
+              <a:tr h="565960">
                 <a:tc>
                   <a:txBody>
                     <a:bodyPr/>
@@ -12895,7 +12951,7 @@
                   </a:ext>
                 </a:extLst>
               </a:tr>
-              <a:tr h="523062">
+              <a:tr h="565960">
                 <a:tc>
                   <a:txBody>
                     <a:bodyPr/>
@@ -12938,7 +12994,7 @@
                   </a:ext>
                 </a:extLst>
               </a:tr>
-              <a:tr h="523062">
+              <a:tr h="565960">
                 <a:tc>
                   <a:txBody>
                     <a:bodyPr/>
@@ -13002,7 +13058,7 @@
                   </a:ext>
                 </a:extLst>
               </a:tr>
-              <a:tr h="523062">
+              <a:tr h="565960">
                 <a:tc>
                   <a:txBody>
                     <a:bodyPr/>
@@ -13028,7 +13084,7 @@
                           </a:solidFill>
                           <a:effectLst/>
                         </a:rPr>
-                        <a:t>0. 71546</a:t>
+                        <a:t>0.71546</a:t>
                       </a:r>
                       <a:endParaRPr lang="en-US" dirty="0"/>
                     </a:p>
@@ -13041,7 +13097,7 @@
                   </a:ext>
                 </a:extLst>
               </a:tr>
-              <a:tr h="523062">
+              <a:tr h="565960">
                 <a:tc>
                   <a:txBody>
                     <a:bodyPr/>
@@ -13071,7 +13127,7 @@
                           </a:solidFill>
                           <a:effectLst/>
                         </a:rPr>
-                        <a:t> 70726</a:t>
+                        <a:t>70726</a:t>
                       </a:r>
                       <a:endParaRPr lang="en-US" dirty="0"/>
                     </a:p>
@@ -13111,7 +13167,7 @@
         <p:spPr>
           <a:xfrm>
             <a:off x="166516" y="1473049"/>
-            <a:ext cx="5401295" cy="3911901"/>
+            <a:ext cx="5701628" cy="4129418"/>
           </a:xfrm>
           <a:prstGeom prst="rect">
             <a:avLst/>
@@ -13170,9 +13226,12 @@
               </a:spcAft>
             </a:pPr>
             <a:r>
-              <a:rPr lang="en-US" sz="1100" dirty="0">
-                <a:solidFill>
-                  <a:srgbClr val="000000"/>
+              <a:rPr lang="en-US" sz="1100" b="1" dirty="0">
+                <a:solidFill>
+                  <a:schemeClr val="tx1">
+                    <a:lumMod val="50000"/>
+                    <a:lumOff val="50000"/>
+                  </a:schemeClr>
                 </a:solidFill>
                 <a:effectLst/>
                 <a:latin typeface="Verdana" panose="020B0604030504040204" pitchFamily="34" charset="0"/>
@@ -13182,15 +13241,25 @@
               <a:t>R = </a:t>
             </a:r>
             <a:r>
-              <a:rPr lang="en-US" sz="1100" dirty="0">
-                <a:solidFill>
-                  <a:srgbClr val="000000"/>
+              <a:rPr lang="en-US" sz="1100" b="1" dirty="0">
+                <a:solidFill>
+                  <a:schemeClr val="tx1">
+                    <a:lumMod val="50000"/>
+                    <a:lumOff val="50000"/>
+                  </a:schemeClr>
                 </a:solidFill>
                 <a:effectLst/>
               </a:rPr>
               <a:t>0.698326</a:t>
             </a:r>
-            <a:endParaRPr lang="en-US" sz="1100" dirty="0"/>
+            <a:endParaRPr lang="en-US" sz="1100" b="1" dirty="0">
+              <a:solidFill>
+                <a:schemeClr val="tx1">
+                  <a:lumMod val="50000"/>
+                  <a:lumOff val="50000"/>
+                </a:schemeClr>
+              </a:solidFill>
+            </a:endParaRPr>
           </a:p>
           <a:p>
             <a:pPr marL="0" marR="0" algn="l">
@@ -13373,36 +13442,6 @@
       </p:sp>
       <p:pic>
         <p:nvPicPr>
-          <p:cNvPr id="12" name="Picture 11">
-            <a:extLst>
-              <a:ext uri="{FF2B5EF4-FFF2-40B4-BE49-F238E27FC236}">
-                <a16:creationId xmlns:a16="http://schemas.microsoft.com/office/drawing/2014/main" id="{6DC8EBDC-4671-4096-AD77-0156BA0D5498}"/>
-              </a:ext>
-            </a:extLst>
-          </p:cNvPr>
-          <p:cNvPicPr>
-            <a:picLocks noChangeAspect="1"/>
-          </p:cNvPicPr>
-          <p:nvPr/>
-        </p:nvPicPr>
-        <p:blipFill>
-          <a:blip r:embed="rId2"/>
-          <a:stretch>
-            <a:fillRect/>
-          </a:stretch>
-        </p:blipFill>
-        <p:spPr>
-          <a:xfrm>
-            <a:off x="33126" y="1360490"/>
-            <a:ext cx="2686049" cy="5381623"/>
-          </a:xfrm>
-          <a:prstGeom prst="rect">
-            <a:avLst/>
-          </a:prstGeom>
-        </p:spPr>
-      </p:pic>
-      <p:pic>
-        <p:nvPicPr>
           <p:cNvPr id="14" name="Picture 13">
             <a:extLst>
               <a:ext uri="{FF2B5EF4-FFF2-40B4-BE49-F238E27FC236}">
@@ -13416,7 +13455,7 @@
           <p:nvPr/>
         </p:nvPicPr>
         <p:blipFill rotWithShape="1">
-          <a:blip r:embed="rId3">
+          <a:blip r:embed="rId2">
             <a:extLst>
               <a:ext uri="{28A0092B-C50C-407E-A947-70E740481C1C}">
                 <a14:useLocalDpi xmlns:a14="http://schemas.microsoft.com/office/drawing/2010/main" val="0"/>
@@ -13451,7 +13490,7 @@
           <p:nvPr/>
         </p:nvPicPr>
         <p:blipFill>
-          <a:blip r:embed="rId4"/>
+          <a:blip r:embed="rId3"/>
           <a:stretch>
             <a:fillRect/>
           </a:stretch>
@@ -13460,6 +13499,71 @@
           <a:xfrm>
             <a:off x="6457952" y="1433511"/>
             <a:ext cx="2604220" cy="5308602"/>
+          </a:xfrm>
+          <a:prstGeom prst="rect">
+            <a:avLst/>
+          </a:prstGeom>
+        </p:spPr>
+      </p:pic>
+      <p:pic>
+        <p:nvPicPr>
+          <p:cNvPr id="7" name="Picture 6">
+            <a:extLst>
+              <a:ext uri="{FF2B5EF4-FFF2-40B4-BE49-F238E27FC236}">
+                <a16:creationId xmlns:a16="http://schemas.microsoft.com/office/drawing/2014/main" id="{869A3AE6-24A5-4D59-8C65-C3E982628AAC}"/>
+              </a:ext>
+            </a:extLst>
+          </p:cNvPr>
+          <p:cNvPicPr>
+            <a:picLocks noChangeAspect="1"/>
+          </p:cNvPicPr>
+          <p:nvPr/>
+        </p:nvPicPr>
+        <p:blipFill>
+          <a:blip r:embed="rId4"/>
+          <a:stretch>
+            <a:fillRect/>
+          </a:stretch>
+        </p:blipFill>
+        <p:spPr>
+          <a:xfrm>
+            <a:off x="101212" y="1368290"/>
+            <a:ext cx="2686049" cy="5381623"/>
+          </a:xfrm>
+          <a:prstGeom prst="rect">
+            <a:avLst/>
+          </a:prstGeom>
+        </p:spPr>
+      </p:pic>
+      <p:pic>
+        <p:nvPicPr>
+          <p:cNvPr id="8" name="Picture 7">
+            <a:extLst>
+              <a:ext uri="{FF2B5EF4-FFF2-40B4-BE49-F238E27FC236}">
+                <a16:creationId xmlns:a16="http://schemas.microsoft.com/office/drawing/2014/main" id="{B03CA76C-7B3C-4D31-B593-CA5229C7877B}"/>
+              </a:ext>
+            </a:extLst>
+          </p:cNvPr>
+          <p:cNvPicPr>
+            <a:picLocks noChangeAspect="1"/>
+          </p:cNvPicPr>
+          <p:nvPr/>
+        </p:nvPicPr>
+        <p:blipFill rotWithShape="1">
+          <a:blip r:embed="rId2">
+            <a:extLst>
+              <a:ext uri="{28A0092B-C50C-407E-A947-70E740481C1C}">
+                <a14:useLocalDpi xmlns:a14="http://schemas.microsoft.com/office/drawing/2010/main" val="0"/>
+              </a:ext>
+            </a:extLst>
+          </a:blip>
+          <a:srcRect l="908" t="3150" r="164" b="48551"/>
+          <a:stretch/>
+        </p:blipFill>
+        <p:spPr>
+          <a:xfrm>
+            <a:off x="2883132" y="1368290"/>
+            <a:ext cx="3587950" cy="3240360"/>
           </a:xfrm>
           <a:prstGeom prst="rect">
             <a:avLst/>
@@ -13480,6 +13584,401 @@
 </file>
 
 <file path=ppt/slides/slide14.xml><?xml version="1.0" encoding="utf-8"?>
+<p:sld xmlns:a="http://schemas.openxmlformats.org/drawingml/2006/main" xmlns:r="http://schemas.openxmlformats.org/officeDocument/2006/relationships" xmlns:p="http://schemas.openxmlformats.org/presentationml/2006/main">
+  <p:cSld>
+    <p:spTree>
+      <p:nvGrpSpPr>
+        <p:cNvPr id="1" name=""/>
+        <p:cNvGrpSpPr/>
+        <p:nvPr/>
+      </p:nvGrpSpPr>
+      <p:grpSpPr>
+        <a:xfrm>
+          <a:off x="0" y="0"/>
+          <a:ext cx="0" cy="0"/>
+          <a:chOff x="0" y="0"/>
+          <a:chExt cx="0" cy="0"/>
+        </a:xfrm>
+      </p:grpSpPr>
+      <p:sp>
+        <p:nvSpPr>
+          <p:cNvPr id="2" name="Text Placeholder 1"/>
+          <p:cNvSpPr>
+            <a:spLocks noGrp="1"/>
+          </p:cNvSpPr>
+          <p:nvPr>
+            <p:ph type="body" idx="1"/>
+          </p:nvPr>
+        </p:nvSpPr>
+        <p:spPr/>
+        <p:txBody>
+          <a:bodyPr/>
+          <a:lstStyle/>
+          <a:p>
+            <a:pPr marL="342900" indent="-342900" algn="just">
+              <a:buFont typeface="Wingdings" panose="05000000000000000000" pitchFamily="2" charset="2"/>
+              <a:buChar char="§"/>
+            </a:pPr>
+            <a:r>
+              <a:rPr lang="en-US" b="0" dirty="0"/>
+              <a:t>The max. Chl-a values ranged from 31, 48, 57 and 50 Mg/</a:t>
+            </a:r>
+            <a:r>
+              <a:rPr lang="en-US" sz="1800" dirty="0">
+                <a:effectLst/>
+                <a:latin typeface="Verdana" panose="020B0604030504040204" pitchFamily="34" charset="0"/>
+                <a:ea typeface="Calibri" panose="020F0502020204030204" pitchFamily="34" charset="0"/>
+                <a:cs typeface="Times New Roman" panose="02020603050405020304" pitchFamily="18" charset="0"/>
+              </a:rPr>
+              <a:t> </a:t>
+            </a:r>
+            <a:r>
+              <a:rPr lang="en-US" b="0" dirty="0">
+                <a:effectLst/>
+                <a:latin typeface="Verdana" panose="020B0604030504040204" pitchFamily="34" charset="0"/>
+                <a:ea typeface="Calibri" panose="020F0502020204030204" pitchFamily="34" charset="0"/>
+                <a:cs typeface="Times New Roman" panose="02020603050405020304" pitchFamily="18" charset="0"/>
+              </a:rPr>
+              <a:t>M</a:t>
+            </a:r>
+            <a:r>
+              <a:rPr lang="en-US" sz="1800" b="0" baseline="30000" dirty="0">
+                <a:effectLst/>
+                <a:latin typeface="Verdana" panose="020B0604030504040204" pitchFamily="34" charset="0"/>
+                <a:ea typeface="Calibri" panose="020F0502020204030204" pitchFamily="34" charset="0"/>
+                <a:cs typeface="Times New Roman" panose="02020603050405020304" pitchFamily="18" charset="0"/>
+              </a:rPr>
+              <a:t>3</a:t>
+            </a:r>
+            <a:r>
+              <a:rPr lang="en-US" b="0" dirty="0"/>
+              <a:t> which are significantly above the optimal (1 to 20Mg/</a:t>
+            </a:r>
+            <a:r>
+              <a:rPr lang="en-US" sz="1800" dirty="0">
+                <a:effectLst/>
+                <a:latin typeface="Verdana" panose="020B0604030504040204" pitchFamily="34" charset="0"/>
+                <a:ea typeface="Calibri" panose="020F0502020204030204" pitchFamily="34" charset="0"/>
+                <a:cs typeface="Times New Roman" panose="02020603050405020304" pitchFamily="18" charset="0"/>
+              </a:rPr>
+              <a:t> </a:t>
+            </a:r>
+            <a:r>
+              <a:rPr lang="en-US" b="0" dirty="0">
+                <a:effectLst/>
+                <a:latin typeface="Verdana" panose="020B0604030504040204" pitchFamily="34" charset="0"/>
+                <a:ea typeface="Calibri" panose="020F0502020204030204" pitchFamily="34" charset="0"/>
+                <a:cs typeface="Times New Roman" panose="02020603050405020304" pitchFamily="18" charset="0"/>
+              </a:rPr>
+              <a:t>M</a:t>
+            </a:r>
+            <a:r>
+              <a:rPr lang="en-US" b="0" baseline="30000" dirty="0">
+                <a:effectLst/>
+                <a:latin typeface="Verdana" panose="020B0604030504040204" pitchFamily="34" charset="0"/>
+                <a:ea typeface="Calibri" panose="020F0502020204030204" pitchFamily="34" charset="0"/>
+                <a:cs typeface="Times New Roman" panose="02020603050405020304" pitchFamily="18" charset="0"/>
+              </a:rPr>
+              <a:t>3</a:t>
+            </a:r>
+            <a:r>
+              <a:rPr lang="en-US" b="0" dirty="0"/>
+              <a:t>) in a non-turbid water body like Lake Victoria.</a:t>
+            </a:r>
+          </a:p>
+          <a:p>
+            <a:pPr marL="342900" indent="-342900" algn="just">
+              <a:buFont typeface="Wingdings" panose="05000000000000000000" pitchFamily="2" charset="2"/>
+              <a:buChar char="§"/>
+            </a:pPr>
+            <a:endParaRPr lang="en-US" b="0" dirty="0"/>
+          </a:p>
+          <a:p>
+            <a:pPr marL="342900" indent="-342900" algn="just">
+              <a:buFont typeface="Wingdings" panose="05000000000000000000" pitchFamily="2" charset="2"/>
+              <a:buChar char="§"/>
+            </a:pPr>
+            <a:r>
+              <a:rPr lang="en-US" b="0" dirty="0"/>
+              <a:t>Corresponding LSAT Maps were generated for the reported HAB dates and reported to have risen to ~35˚C and ~36˚C in HAB events unlike </a:t>
+            </a:r>
+            <a:r>
+              <a:rPr lang="en-US" b="0" dirty="0" err="1"/>
+              <a:t>aprox</a:t>
+            </a:r>
+            <a:r>
+              <a:rPr lang="en-US" b="0" dirty="0"/>
+              <a:t>. ~25˚C for normal conditions.</a:t>
+            </a:r>
+          </a:p>
+          <a:p>
+            <a:pPr marL="342900" indent="-342900" algn="just">
+              <a:buFont typeface="Wingdings" panose="05000000000000000000" pitchFamily="2" charset="2"/>
+              <a:buChar char="§"/>
+            </a:pPr>
+            <a:endParaRPr lang="en-US" b="0" dirty="0"/>
+          </a:p>
+          <a:p>
+            <a:pPr marL="342900" indent="-342900" algn="just">
+              <a:buFont typeface="Wingdings" panose="05000000000000000000" pitchFamily="2" charset="2"/>
+              <a:buChar char="§"/>
+            </a:pPr>
+            <a:r>
+              <a:rPr lang="en-US" b="0" dirty="0"/>
+              <a:t>The chl-a and LSAT estimates were validated with well known products and found to correlate from 69% to 90%.</a:t>
+            </a:r>
+          </a:p>
+        </p:txBody>
+      </p:sp>
+      <p:sp>
+        <p:nvSpPr>
+          <p:cNvPr id="3" name="Footer Placeholder 2"/>
+          <p:cNvSpPr>
+            <a:spLocks noGrp="1"/>
+          </p:cNvSpPr>
+          <p:nvPr>
+            <p:ph type="ftr" sz="quarter" idx="10"/>
+          </p:nvPr>
+        </p:nvSpPr>
+        <p:spPr/>
+        <p:txBody>
+          <a:bodyPr/>
+          <a:lstStyle/>
+          <a:p>
+            <a:pPr>
+              <a:defRPr/>
+            </a:pPr>
+            <a:endParaRPr lang="de-DE"/>
+          </a:p>
+          <a:p>
+            <a:pPr>
+              <a:defRPr/>
+            </a:pPr>
+            <a:endParaRPr lang="de-DE"/>
+          </a:p>
+        </p:txBody>
+      </p:sp>
+      <p:sp>
+        <p:nvSpPr>
+          <p:cNvPr id="4" name="Title 3"/>
+          <p:cNvSpPr>
+            <a:spLocks noGrp="1"/>
+          </p:cNvSpPr>
+          <p:nvPr>
+            <p:ph type="title"/>
+          </p:nvPr>
+        </p:nvSpPr>
+        <p:spPr/>
+        <p:txBody>
+          <a:bodyPr/>
+          <a:lstStyle/>
+          <a:p>
+            <a:r>
+              <a:rPr lang="en-US" dirty="0"/>
+              <a:t>Discussions </a:t>
+            </a:r>
+          </a:p>
+        </p:txBody>
+      </p:sp>
+    </p:spTree>
+    <p:extLst>
+      <p:ext uri="{BB962C8B-B14F-4D97-AF65-F5344CB8AC3E}">
+        <p14:creationId xmlns:p14="http://schemas.microsoft.com/office/powerpoint/2010/main" val="2544407299"/>
+      </p:ext>
+    </p:extLst>
+  </p:cSld>
+  <p:clrMapOvr>
+    <a:masterClrMapping/>
+  </p:clrMapOvr>
+</p:sld>
+</file>
+
+<file path=ppt/slides/slide15.xml><?xml version="1.0" encoding="utf-8"?>
+<p:sld xmlns:a="http://schemas.openxmlformats.org/drawingml/2006/main" xmlns:r="http://schemas.openxmlformats.org/officeDocument/2006/relationships" xmlns:p="http://schemas.openxmlformats.org/presentationml/2006/main">
+  <p:cSld>
+    <p:spTree>
+      <p:nvGrpSpPr>
+        <p:cNvPr id="1" name=""/>
+        <p:cNvGrpSpPr/>
+        <p:nvPr/>
+      </p:nvGrpSpPr>
+      <p:grpSpPr>
+        <a:xfrm>
+          <a:off x="0" y="0"/>
+          <a:ext cx="0" cy="0"/>
+          <a:chOff x="0" y="0"/>
+          <a:chExt cx="0" cy="0"/>
+        </a:xfrm>
+      </p:grpSpPr>
+      <p:sp>
+        <p:nvSpPr>
+          <p:cNvPr id="2" name="Text Placeholder 1"/>
+          <p:cNvSpPr>
+            <a:spLocks noGrp="1"/>
+          </p:cNvSpPr>
+          <p:nvPr>
+            <p:ph type="body" idx="1"/>
+          </p:nvPr>
+        </p:nvSpPr>
+        <p:spPr/>
+        <p:txBody>
+          <a:bodyPr/>
+          <a:lstStyle/>
+          <a:p>
+            <a:pPr marL="522288" indent="-342900" algn="just">
+              <a:buFont typeface="Wingdings" panose="05000000000000000000" pitchFamily="2" charset="2"/>
+              <a:buChar char="§"/>
+            </a:pPr>
+            <a:r>
+              <a:rPr lang="en-US" b="0" dirty="0"/>
+              <a:t>Wide spread chl-a concentration maps were generated from the proposed methodology to monitor HABs.</a:t>
+            </a:r>
+          </a:p>
+          <a:p>
+            <a:pPr marL="522288" indent="-342900" algn="just">
+              <a:buFont typeface="Wingdings" panose="05000000000000000000" pitchFamily="2" charset="2"/>
+              <a:buChar char="§"/>
+            </a:pPr>
+            <a:endParaRPr lang="en-US" b="0" dirty="0"/>
+          </a:p>
+          <a:p>
+            <a:pPr marL="522288" indent="-342900" algn="just">
+              <a:buFont typeface="Wingdings" panose="05000000000000000000" pitchFamily="2" charset="2"/>
+              <a:buChar char="§"/>
+            </a:pPr>
+            <a:r>
+              <a:rPr lang="en-US" b="0" dirty="0"/>
+              <a:t>Corresponding LSAT maps were as well generated from the and reportedly, the LSAT rose on bloom events.</a:t>
+            </a:r>
+          </a:p>
+          <a:p>
+            <a:pPr marL="522288" indent="-342900" algn="just">
+              <a:buFont typeface="Wingdings" panose="05000000000000000000" pitchFamily="2" charset="2"/>
+              <a:buChar char="§"/>
+            </a:pPr>
+            <a:endParaRPr lang="en-US" b="0" dirty="0"/>
+          </a:p>
+          <a:p>
+            <a:pPr marL="522288" indent="-342900" algn="just">
+              <a:buFont typeface="Wingdings" panose="05000000000000000000" pitchFamily="2" charset="2"/>
+              <a:buChar char="§"/>
+            </a:pPr>
+            <a:r>
+              <a:rPr lang="en-US" b="0" dirty="0"/>
+              <a:t>Chl-a and LSAT estimates were validated</a:t>
+            </a:r>
+          </a:p>
+          <a:p>
+            <a:pPr marL="522288" indent="-342900" algn="just">
+              <a:buFont typeface="Wingdings" panose="05000000000000000000" pitchFamily="2" charset="2"/>
+              <a:buChar char="§"/>
+            </a:pPr>
+            <a:endParaRPr lang="en-US" b="0" dirty="0"/>
+          </a:p>
+          <a:p>
+            <a:pPr marL="522288" indent="-342900" algn="just">
+              <a:buFont typeface="Wingdings" panose="05000000000000000000" pitchFamily="2" charset="2"/>
+              <a:buChar char="§"/>
+            </a:pPr>
+            <a:r>
+              <a:rPr lang="en-US" b="0" dirty="0"/>
+              <a:t>Autonomous In-situ IoT system was developed and tested in local University water bodies and found capable of relaying near-real time geotagged data.</a:t>
+            </a:r>
+          </a:p>
+          <a:p>
+            <a:pPr indent="0" algn="just"/>
+            <a:r>
+              <a:rPr lang="en-US" dirty="0"/>
+              <a:t>Recommendation </a:t>
+            </a:r>
+          </a:p>
+          <a:p>
+            <a:pPr marL="522288" indent="-342900" algn="just">
+              <a:buFont typeface="Wingdings" panose="05000000000000000000" pitchFamily="2" charset="2"/>
+              <a:buChar char="§"/>
+            </a:pPr>
+            <a:r>
+              <a:rPr lang="en-US" b="0" dirty="0"/>
+              <a:t>Cloud based compactional servers for automatic download for greater spatial </a:t>
+            </a:r>
+            <a:r>
+              <a:rPr lang="en-US" b="0"/>
+              <a:t>extents analysis,  </a:t>
+            </a:r>
+            <a:r>
+              <a:rPr lang="en-US" b="0" dirty="0"/>
+              <a:t>availability of Salinity sensor </a:t>
+            </a:r>
+          </a:p>
+          <a:p>
+            <a:endParaRPr lang="en-US" dirty="0"/>
+          </a:p>
+        </p:txBody>
+      </p:sp>
+      <p:sp>
+        <p:nvSpPr>
+          <p:cNvPr id="3" name="Footer Placeholder 2"/>
+          <p:cNvSpPr>
+            <a:spLocks noGrp="1"/>
+          </p:cNvSpPr>
+          <p:nvPr>
+            <p:ph type="ftr" sz="quarter" idx="10"/>
+          </p:nvPr>
+        </p:nvSpPr>
+        <p:spPr/>
+        <p:txBody>
+          <a:bodyPr/>
+          <a:lstStyle/>
+          <a:p>
+            <a:pPr>
+              <a:defRPr/>
+            </a:pPr>
+            <a:endParaRPr lang="de-DE"/>
+          </a:p>
+          <a:p>
+            <a:pPr>
+              <a:defRPr/>
+            </a:pPr>
+            <a:endParaRPr lang="de-DE"/>
+          </a:p>
+        </p:txBody>
+      </p:sp>
+      <p:sp>
+        <p:nvSpPr>
+          <p:cNvPr id="4" name="Title 3"/>
+          <p:cNvSpPr>
+            <a:spLocks noGrp="1"/>
+          </p:cNvSpPr>
+          <p:nvPr>
+            <p:ph type="title"/>
+          </p:nvPr>
+        </p:nvSpPr>
+        <p:spPr/>
+        <p:txBody>
+          <a:bodyPr/>
+          <a:lstStyle/>
+          <a:p>
+            <a:r>
+              <a:rPr lang="en-US" dirty="0"/>
+              <a:t>Conclusions and Recommendations</a:t>
+            </a:r>
+          </a:p>
+        </p:txBody>
+      </p:sp>
+    </p:spTree>
+    <p:extLst>
+      <p:ext uri="{BB962C8B-B14F-4D97-AF65-F5344CB8AC3E}">
+        <p14:creationId xmlns:p14="http://schemas.microsoft.com/office/powerpoint/2010/main" val="3052115942"/>
+      </p:ext>
+    </p:extLst>
+  </p:cSld>
+  <p:clrMapOvr>
+    <a:masterClrMapping/>
+  </p:clrMapOvr>
+</p:sld>
+</file>
+
+<file path=ppt/slides/slide16.xml><?xml version="1.0" encoding="utf-8"?>
 <p:sld xmlns:a="http://schemas.openxmlformats.org/drawingml/2006/main" xmlns:r="http://schemas.openxmlformats.org/officeDocument/2006/relationships" xmlns:p="http://schemas.openxmlformats.org/presentationml/2006/main">
   <p:cSld>
     <p:spTree>
@@ -13860,7 +14359,7 @@
             </a:r>
             <a:r>
               <a:rPr lang="en-US" sz="1600" b="0" dirty="0"/>
-              <a:t>, etc. Which has been lately observed in L. Victoria riparian reserves due to eutrophication in the region. 		          (</a:t>
+              <a:t>, etc.as lately observed in eutrophicated L. Victoria riparian. 		          						            (</a:t>
             </a:r>
             <a:r>
               <a:rPr lang="en-US" sz="1600" b="0" dirty="0" err="1">
@@ -13977,7 +14476,7 @@
             </a:pPr>
             <a:r>
               <a:rPr lang="en-US" sz="1600" b="0" dirty="0"/>
-              <a:t>In spite of being potentially harmful to the locals, the status quo only provides for the higher authority to solely rely on calls/information from the local residents after the condition is a total mess without relying on any near real-time space-based or in-situ monitoring system. 		            </a:t>
+              <a:t>The status quo only provides for the higher authority to solely rely on calls/information from the locals after the condition is a total mess without relying on any near real-time space-based or in-situ monitoring system. 		            </a:t>
             </a:r>
           </a:p>
           <a:p>
@@ -14358,14 +14857,14 @@
             </a:pPr>
             <a:r>
               <a:rPr lang="en-GB" sz="2200" b="0" dirty="0"/>
-              <a:t>To detect, monitor and report the occurrence of Harmful Algal Blooms(HABs) in Lake Victoria, Kisumu basin.</a:t>
+              <a:t>To detect, monitor and report the occurrence of Harmful Algal Blooms(HABs) in Lake Victoria, Kisumu basin from 2015 to 2020 and beyond.</a:t>
             </a:r>
           </a:p>
           <a:p>
             <a:pPr marL="358775" lvl="2" indent="0" algn="just">
               <a:buNone/>
             </a:pPr>
-            <a:endParaRPr lang="en-GB" sz="2100" b="0" dirty="0"/>
+            <a:endParaRPr lang="en-GB" sz="2100" dirty="0"/>
           </a:p>
           <a:p>
             <a:pPr marL="512762" lvl="1" indent="-342900" algn="just">
@@ -14741,7 +15240,7 @@
           <a:p>
             <a:r>
               <a:rPr lang="en-US" dirty="0"/>
-              <a:t>General and specific objectives </a:t>
+              <a:t>General and Specific objectives </a:t>
             </a:r>
           </a:p>
         </p:txBody>
@@ -14834,7 +15333,7 @@
           <a:p>
             <a:r>
               <a:rPr lang="en-US" dirty="0"/>
-              <a:t> Study Area</a:t>
+              <a:t> Study Area: Lake Victoria Nyanza Gulf</a:t>
             </a:r>
           </a:p>
         </p:txBody>
@@ -15217,14 +15716,14 @@
           <p:nvPr>
             <p:extLst>
               <p:ext uri="{D42A27DB-BD31-4B8C-83A1-F6EECF244321}">
-                <p14:modId xmlns:p14="http://schemas.microsoft.com/office/powerpoint/2010/main" val="2902308201"/>
+                <p14:modId xmlns:p14="http://schemas.microsoft.com/office/powerpoint/2010/main" val="1060110228"/>
               </p:ext>
             </p:extLst>
           </p:nvPr>
         </p:nvGraphicFramePr>
         <p:xfrm>
-          <a:off x="235851" y="4572070"/>
-          <a:ext cx="8641656" cy="1796980"/>
+          <a:off x="235851" y="4653136"/>
+          <a:ext cx="8641656" cy="1857202"/>
         </p:xfrm>
         <a:graphic>
           <a:graphicData uri="http://schemas.openxmlformats.org/drawingml/2006/table">
@@ -15255,7 +15754,7 @@
                   </a:extLst>
                 </a:gridCol>
               </a:tblGrid>
-              <a:tr h="331573">
+              <a:tr h="342685">
                 <a:tc>
                   <a:txBody>
                     <a:bodyPr/>
@@ -15358,7 +15857,7 @@
                   </a:ext>
                 </a:extLst>
               </a:tr>
-              <a:tr h="552537">
+              <a:tr h="571054">
                 <a:tc>
                   <a:txBody>
                     <a:bodyPr/>
@@ -15463,7 +15962,7 @@
                   </a:ext>
                 </a:extLst>
               </a:tr>
-              <a:tr h="331573">
+              <a:tr h="342685">
                 <a:tc>
                   <a:txBody>
                     <a:bodyPr/>
@@ -15566,7 +16065,7 @@
                   </a:ext>
                 </a:extLst>
               </a:tr>
-              <a:tr h="581297">
+              <a:tr h="600778">
                 <a:tc>
                   <a:txBody>
                     <a:bodyPr/>
@@ -15688,14 +16187,14 @@
           <p:nvPr>
             <p:extLst>
               <p:ext uri="{D42A27DB-BD31-4B8C-83A1-F6EECF244321}">
-                <p14:modId xmlns:p14="http://schemas.microsoft.com/office/powerpoint/2010/main" val="1667758896"/>
+                <p14:modId xmlns:p14="http://schemas.microsoft.com/office/powerpoint/2010/main" val="3414151144"/>
               </p:ext>
             </p:extLst>
           </p:nvPr>
         </p:nvGraphicFramePr>
         <p:xfrm>
           <a:off x="235851" y="1468438"/>
-          <a:ext cx="8641656" cy="2911070"/>
+          <a:ext cx="8641656" cy="3040682"/>
         </p:xfrm>
         <a:graphic>
           <a:graphicData uri="http://schemas.openxmlformats.org/drawingml/2006/table">
@@ -15726,7 +16225,7 @@
                   </a:extLst>
                 </a:gridCol>
               </a:tblGrid>
-              <a:tr h="404425">
+              <a:tr h="422432">
                 <a:tc>
                   <a:txBody>
                     <a:bodyPr/>
@@ -15829,7 +16328,7 @@
                   </a:ext>
                 </a:extLst>
               </a:tr>
-              <a:tr h="647412">
+              <a:tr h="676237">
                 <a:tc>
                   <a:txBody>
                     <a:bodyPr/>
@@ -15976,7 +16475,7 @@
                   </a:ext>
                 </a:extLst>
               </a:tr>
-              <a:tr h="647412">
+              <a:tr h="676237">
                 <a:tc>
                   <a:txBody>
                     <a:bodyPr/>
@@ -16120,7 +16619,7 @@
                   </a:ext>
                 </a:extLst>
               </a:tr>
-              <a:tr h="647412">
+              <a:tr h="676237">
                 <a:tc>
                   <a:txBody>
                     <a:bodyPr/>
@@ -16239,7 +16738,7 @@
                   </a:ext>
                 </a:extLst>
               </a:tr>
-              <a:tr h="564409">
+              <a:tr h="589539">
                 <a:tc>
                   <a:txBody>
                     <a:bodyPr/>
@@ -18487,7 +18986,7 @@
         </p:nvSpPr>
         <p:spPr>
           <a:xfrm>
-            <a:off x="4088326" y="5532740"/>
+            <a:off x="4075668" y="5518271"/>
             <a:ext cx="805839" cy="436880"/>
           </a:xfrm>
           <a:prstGeom prst="flowChartProcess">
@@ -18574,12 +19073,12 @@
         </p:nvCxnSpPr>
         <p:spPr>
           <a:xfrm rot="10800000" flipH="1">
-            <a:off x="896956" y="1325262"/>
-            <a:ext cx="313427" cy="4404981"/>
+            <a:off x="430768" y="1325262"/>
+            <a:ext cx="779615" cy="4418685"/>
           </a:xfrm>
           <a:prstGeom prst="bentConnector3">
             <a:avLst>
-              <a:gd name="adj1" fmla="val -216630"/>
+              <a:gd name="adj1" fmla="val -29322"/>
             </a:avLst>
           </a:prstGeom>
           <a:ln>
@@ -18616,7 +19115,7 @@
         </p:nvSpPr>
         <p:spPr>
           <a:xfrm>
-            <a:off x="896957" y="5553841"/>
+            <a:off x="430769" y="5567545"/>
             <a:ext cx="930592" cy="352802"/>
           </a:xfrm>
           <a:prstGeom prst="flowChartProcess">
@@ -19346,8 +19845,8 @@
         </p:nvCxnSpPr>
         <p:spPr>
           <a:xfrm flipV="1">
-            <a:off x="4894165" y="5730242"/>
-            <a:ext cx="1286795" cy="20938"/>
+            <a:off x="4881507" y="5730242"/>
+            <a:ext cx="1299453" cy="6469"/>
           </a:xfrm>
           <a:prstGeom prst="bentConnector3">
             <a:avLst>
@@ -19387,7 +19886,7 @@
         </p:nvSpPr>
         <p:spPr>
           <a:xfrm>
-            <a:off x="1848910" y="5449347"/>
+            <a:off x="1613304" y="5459263"/>
             <a:ext cx="2218054" cy="554897"/>
           </a:xfrm>
           <a:prstGeom prst="flowChartDecision">
@@ -19458,49 +19957,6 @@
           </a:p>
         </p:txBody>
       </p:sp>
-      <p:cxnSp>
-        <p:nvCxnSpPr>
-          <p:cNvPr id="105" name="Straight Arrow Connector 104">
-            <a:extLst>
-              <a:ext uri="{FF2B5EF4-FFF2-40B4-BE49-F238E27FC236}">
-                <a16:creationId xmlns:a16="http://schemas.microsoft.com/office/drawing/2014/main" id="{F5E88F2D-ED0C-4CB9-9A1C-8DD160B5983F}"/>
-              </a:ext>
-            </a:extLst>
-          </p:cNvPr>
-          <p:cNvCxnSpPr>
-            <a:cxnSpLocks/>
-            <a:stCxn id="16" idx="2"/>
-            <a:endCxn id="86" idx="0"/>
-          </p:cNvCxnSpPr>
-          <p:nvPr/>
-        </p:nvCxnSpPr>
-        <p:spPr>
-          <a:xfrm>
-            <a:off x="2931257" y="5062937"/>
-            <a:ext cx="26680" cy="386410"/>
-          </a:xfrm>
-          <a:prstGeom prst="straightConnector1">
-            <a:avLst/>
-          </a:prstGeom>
-          <a:ln>
-            <a:tailEnd type="triangle"/>
-          </a:ln>
-        </p:spPr>
-        <p:style>
-          <a:lnRef idx="1">
-            <a:schemeClr val="accent1"/>
-          </a:lnRef>
-          <a:fillRef idx="0">
-            <a:schemeClr val="accent1"/>
-          </a:fillRef>
-          <a:effectRef idx="0">
-            <a:schemeClr val="accent1"/>
-          </a:effectRef>
-          <a:fontRef idx="minor">
-            <a:schemeClr val="tx1"/>
-          </a:fontRef>
-        </p:style>
-      </p:cxnSp>
       <p:sp>
         <p:nvSpPr>
           <p:cNvPr id="114" name="Rectangle: Rounded Corners 113">
@@ -19685,8 +20141,8 @@
         </p:nvCxnSpPr>
         <p:spPr>
           <a:xfrm rot="5400000" flipH="1" flipV="1">
-            <a:off x="4554566" y="5025296"/>
-            <a:ext cx="444125" cy="570765"/>
+            <a:off x="4555471" y="5011732"/>
+            <a:ext cx="429656" cy="583423"/>
           </a:xfrm>
           <a:prstGeom prst="bentConnector2">
             <a:avLst/>
@@ -20157,6 +20613,134 @@
           </a:prstGeom>
           <a:ln>
             <a:prstDash val="lgDashDotDot"/>
+          </a:ln>
+        </p:spPr>
+        <p:style>
+          <a:lnRef idx="1">
+            <a:schemeClr val="accent1"/>
+          </a:lnRef>
+          <a:fillRef idx="0">
+            <a:schemeClr val="accent1"/>
+          </a:fillRef>
+          <a:effectRef idx="0">
+            <a:schemeClr val="accent1"/>
+          </a:effectRef>
+          <a:fontRef idx="minor">
+            <a:schemeClr val="tx1"/>
+          </a:fontRef>
+        </p:style>
+      </p:cxnSp>
+      <p:cxnSp>
+        <p:nvCxnSpPr>
+          <p:cNvPr id="8" name="Connector: Elbow 7">
+            <a:extLst>
+              <a:ext uri="{FF2B5EF4-FFF2-40B4-BE49-F238E27FC236}">
+                <a16:creationId xmlns:a16="http://schemas.microsoft.com/office/drawing/2014/main" id="{44671A5E-C59D-4592-B574-1275497D57B5}"/>
+              </a:ext>
+            </a:extLst>
+          </p:cNvPr>
+          <p:cNvCxnSpPr>
+            <a:cxnSpLocks/>
+            <a:stCxn id="16" idx="2"/>
+            <a:endCxn id="86" idx="0"/>
+          </p:cNvCxnSpPr>
+          <p:nvPr/>
+        </p:nvCxnSpPr>
+        <p:spPr>
+          <a:xfrm rot="5400000">
+            <a:off x="2628631" y="5156637"/>
+            <a:ext cx="396326" cy="208926"/>
+          </a:xfrm>
+          <a:prstGeom prst="bentConnector3">
+            <a:avLst/>
+          </a:prstGeom>
+          <a:ln>
+            <a:tailEnd type="triangle"/>
+          </a:ln>
+        </p:spPr>
+        <p:style>
+          <a:lnRef idx="1">
+            <a:schemeClr val="accent1"/>
+          </a:lnRef>
+          <a:fillRef idx="0">
+            <a:schemeClr val="accent1"/>
+          </a:fillRef>
+          <a:effectRef idx="0">
+            <a:schemeClr val="accent1"/>
+          </a:effectRef>
+          <a:fontRef idx="minor">
+            <a:schemeClr val="tx1"/>
+          </a:fontRef>
+        </p:style>
+      </p:cxnSp>
+      <p:cxnSp>
+        <p:nvCxnSpPr>
+          <p:cNvPr id="14" name="Straight Arrow Connector 13">
+            <a:extLst>
+              <a:ext uri="{FF2B5EF4-FFF2-40B4-BE49-F238E27FC236}">
+                <a16:creationId xmlns:a16="http://schemas.microsoft.com/office/drawing/2014/main" id="{D78E8164-F27C-4039-A491-D8D80557ED36}"/>
+              </a:ext>
+            </a:extLst>
+          </p:cNvPr>
+          <p:cNvCxnSpPr>
+            <a:cxnSpLocks/>
+            <a:stCxn id="86" idx="3"/>
+            <a:endCxn id="120" idx="1"/>
+          </p:cNvCxnSpPr>
+          <p:nvPr/>
+        </p:nvCxnSpPr>
+        <p:spPr>
+          <a:xfrm flipV="1">
+            <a:off x="3831358" y="5736711"/>
+            <a:ext cx="244310" cy="1"/>
+          </a:xfrm>
+          <a:prstGeom prst="straightConnector1">
+            <a:avLst/>
+          </a:prstGeom>
+          <a:ln>
+            <a:tailEnd type="triangle"/>
+          </a:ln>
+        </p:spPr>
+        <p:style>
+          <a:lnRef idx="1">
+            <a:schemeClr val="accent1"/>
+          </a:lnRef>
+          <a:fillRef idx="0">
+            <a:schemeClr val="accent1"/>
+          </a:fillRef>
+          <a:effectRef idx="0">
+            <a:schemeClr val="accent1"/>
+          </a:effectRef>
+          <a:fontRef idx="minor">
+            <a:schemeClr val="tx1"/>
+          </a:fontRef>
+        </p:style>
+      </p:cxnSp>
+      <p:cxnSp>
+        <p:nvCxnSpPr>
+          <p:cNvPr id="23" name="Straight Arrow Connector 22">
+            <a:extLst>
+              <a:ext uri="{FF2B5EF4-FFF2-40B4-BE49-F238E27FC236}">
+                <a16:creationId xmlns:a16="http://schemas.microsoft.com/office/drawing/2014/main" id="{C139A935-0F7C-4A34-8F1B-1A85A3D2A178}"/>
+              </a:ext>
+            </a:extLst>
+          </p:cNvPr>
+          <p:cNvCxnSpPr>
+            <a:stCxn id="86" idx="1"/>
+            <a:endCxn id="133" idx="3"/>
+          </p:cNvCxnSpPr>
+          <p:nvPr/>
+        </p:nvCxnSpPr>
+        <p:spPr>
+          <a:xfrm flipH="1">
+            <a:off x="1361361" y="5736712"/>
+            <a:ext cx="251943" cy="7234"/>
+          </a:xfrm>
+          <a:prstGeom prst="straightConnector1">
+            <a:avLst/>
+          </a:prstGeom>
+          <a:ln>
+            <a:tailEnd type="triangle"/>
           </a:ln>
         </p:spPr>
         <p:style>
@@ -21437,7 +22021,7 @@
                 </a:solidFill>
                 <a:latin typeface="Arial" charset="0"/>
               </a:rPr>
-              <a:t>Upload in-situ data to Processor</a:t>
+              <a:t>Upload in-situ data to Local DB</a:t>
             </a:r>
           </a:p>
         </p:txBody>
@@ -21491,7 +22075,7 @@
                 </a:solidFill>
                 <a:latin typeface="Arial" charset="0"/>
               </a:rPr>
-              <a:t>Upload in-situ data to reporter</a:t>
+              <a:t>Upload in-situ data to Reporter</a:t>
             </a:r>
           </a:p>
         </p:txBody>
@@ -21909,114 +22493,6 @@
           </a:p>
         </p:txBody>
       </p:sp>
-      <p:pic>
-        <p:nvPicPr>
-          <p:cNvPr id="5" name="Picture 4">
-            <a:extLst>
-              <a:ext uri="{FF2B5EF4-FFF2-40B4-BE49-F238E27FC236}">
-                <a16:creationId xmlns:a16="http://schemas.microsoft.com/office/drawing/2014/main" id="{40B3DC9D-AFD3-45CD-84E7-6F5CB7D2D5E2}"/>
-              </a:ext>
-            </a:extLst>
-          </p:cNvPr>
-          <p:cNvPicPr>
-            <a:picLocks noChangeAspect="1"/>
-          </p:cNvPicPr>
-          <p:nvPr/>
-        </p:nvPicPr>
-        <p:blipFill>
-          <a:blip r:embed="rId2">
-            <a:extLst>
-              <a:ext uri="{28A0092B-C50C-407E-A947-70E740481C1C}">
-                <a14:useLocalDpi xmlns:a14="http://schemas.microsoft.com/office/drawing/2010/main" val="0"/>
-              </a:ext>
-            </a:extLst>
-          </a:blip>
-          <a:stretch>
-            <a:fillRect/>
-          </a:stretch>
-        </p:blipFill>
-        <p:spPr>
-          <a:xfrm>
-            <a:off x="286912" y="1741365"/>
-            <a:ext cx="3971290" cy="2290272"/>
-          </a:xfrm>
-          <a:prstGeom prst="rect">
-            <a:avLst/>
-          </a:prstGeom>
-        </p:spPr>
-      </p:pic>
-      <p:pic>
-        <p:nvPicPr>
-          <p:cNvPr id="6" name="Picture 5">
-            <a:extLst>
-              <a:ext uri="{FF2B5EF4-FFF2-40B4-BE49-F238E27FC236}">
-                <a16:creationId xmlns:a16="http://schemas.microsoft.com/office/drawing/2014/main" id="{F2FA7EFC-01A8-4B47-AF79-FEA57EE69E64}"/>
-              </a:ext>
-            </a:extLst>
-          </p:cNvPr>
-          <p:cNvPicPr>
-            <a:picLocks noChangeAspect="1"/>
-          </p:cNvPicPr>
-          <p:nvPr/>
-        </p:nvPicPr>
-        <p:blipFill>
-          <a:blip r:embed="rId3">
-            <a:extLst>
-              <a:ext uri="{28A0092B-C50C-407E-A947-70E740481C1C}">
-                <a14:useLocalDpi xmlns:a14="http://schemas.microsoft.com/office/drawing/2010/main" val="0"/>
-              </a:ext>
-            </a:extLst>
-          </a:blip>
-          <a:stretch>
-            <a:fillRect/>
-          </a:stretch>
-        </p:blipFill>
-        <p:spPr>
-          <a:xfrm>
-            <a:off x="4885800" y="1772574"/>
-            <a:ext cx="3799205" cy="2280285"/>
-          </a:xfrm>
-          <a:prstGeom prst="rect">
-            <a:avLst/>
-          </a:prstGeom>
-        </p:spPr>
-      </p:pic>
-      <p:pic>
-        <p:nvPicPr>
-          <p:cNvPr id="7" name="Picture 6">
-            <a:extLst>
-              <a:ext uri="{FF2B5EF4-FFF2-40B4-BE49-F238E27FC236}">
-                <a16:creationId xmlns:a16="http://schemas.microsoft.com/office/drawing/2014/main" id="{B1194237-DAD4-4215-96C0-D24232BA5D83}"/>
-              </a:ext>
-            </a:extLst>
-          </p:cNvPr>
-          <p:cNvPicPr>
-            <a:picLocks noChangeAspect="1"/>
-          </p:cNvPicPr>
-          <p:nvPr/>
-        </p:nvPicPr>
-        <p:blipFill>
-          <a:blip r:embed="rId4">
-            <a:extLst>
-              <a:ext uri="{28A0092B-C50C-407E-A947-70E740481C1C}">
-                <a14:useLocalDpi xmlns:a14="http://schemas.microsoft.com/office/drawing/2010/main" val="0"/>
-              </a:ext>
-            </a:extLst>
-          </a:blip>
-          <a:stretch>
-            <a:fillRect/>
-          </a:stretch>
-        </p:blipFill>
-        <p:spPr>
-          <a:xfrm>
-            <a:off x="4668756" y="4272761"/>
-            <a:ext cx="4265015" cy="2389444"/>
-          </a:xfrm>
-          <a:prstGeom prst="rect">
-            <a:avLst/>
-          </a:prstGeom>
-        </p:spPr>
-      </p:pic>
       <p:sp>
         <p:nvSpPr>
           <p:cNvPr id="9" name="Text Box 2">
@@ -22033,8 +22509,8 @@
         </p:nvSpPr>
         <p:spPr bwMode="auto">
           <a:xfrm>
-            <a:off x="7689" y="1445574"/>
-            <a:ext cx="8877517" cy="267502"/>
+            <a:off x="83131" y="1425260"/>
+            <a:ext cx="8877517" cy="280309"/>
           </a:xfrm>
           <a:prstGeom prst="rect">
             <a:avLst/>
@@ -22168,7 +22644,7 @@
         </p:nvSpPr>
         <p:spPr bwMode="auto">
           <a:xfrm>
-            <a:off x="7688" y="3971499"/>
+            <a:off x="0" y="4154736"/>
             <a:ext cx="8926083" cy="280309"/>
           </a:xfrm>
           <a:prstGeom prst="rect">
@@ -22261,10 +22737,10 @@
       </p:sp>
       <p:pic>
         <p:nvPicPr>
-          <p:cNvPr id="11" name="Picture 10">
+          <p:cNvPr id="8" name="Picture 7">
             <a:extLst>
               <a:ext uri="{FF2B5EF4-FFF2-40B4-BE49-F238E27FC236}">
-                <a16:creationId xmlns:a16="http://schemas.microsoft.com/office/drawing/2014/main" id="{36593347-6F2A-4027-9FA5-33CDAD79DBCC}"/>
+                <a16:creationId xmlns:a16="http://schemas.microsoft.com/office/drawing/2014/main" id="{3356A39C-A1BE-4A4E-A174-63772D3E20AE}"/>
               </a:ext>
             </a:extLst>
           </p:cNvPr>
@@ -22274,21 +22750,105 @@
           <p:nvPr/>
         </p:nvPicPr>
         <p:blipFill>
-          <a:blip r:embed="rId5">
-            <a:extLst>
-              <a:ext uri="{28A0092B-C50C-407E-A947-70E740481C1C}">
-                <a14:useLocalDpi xmlns:a14="http://schemas.microsoft.com/office/drawing/2010/main" val="0"/>
-              </a:ext>
-            </a:extLst>
-          </a:blip>
+          <a:blip r:embed="rId3"/>
           <a:stretch>
             <a:fillRect/>
           </a:stretch>
         </p:blipFill>
         <p:spPr>
           <a:xfrm>
-            <a:off x="59972" y="4258963"/>
-            <a:ext cx="4198230" cy="2306926"/>
+            <a:off x="132056" y="1719840"/>
+            <a:ext cx="4229893" cy="2389445"/>
+          </a:xfrm>
+          <a:prstGeom prst="rect">
+            <a:avLst/>
+          </a:prstGeom>
+        </p:spPr>
+      </p:pic>
+      <p:pic>
+        <p:nvPicPr>
+          <p:cNvPr id="15" name="Picture 14">
+            <a:extLst>
+              <a:ext uri="{FF2B5EF4-FFF2-40B4-BE49-F238E27FC236}">
+                <a16:creationId xmlns:a16="http://schemas.microsoft.com/office/drawing/2014/main" id="{B4AF41BD-322A-49C6-8328-13062FE6D7EC}"/>
+              </a:ext>
+            </a:extLst>
+          </p:cNvPr>
+          <p:cNvPicPr>
+            <a:picLocks noChangeAspect="1"/>
+          </p:cNvPicPr>
+          <p:nvPr/>
+        </p:nvPicPr>
+        <p:blipFill>
+          <a:blip r:embed="rId4"/>
+          <a:stretch>
+            <a:fillRect/>
+          </a:stretch>
+        </p:blipFill>
+        <p:spPr>
+          <a:xfrm>
+            <a:off x="4577184" y="1688496"/>
+            <a:ext cx="4348899" cy="2389445"/>
+          </a:xfrm>
+          <a:prstGeom prst="rect">
+            <a:avLst/>
+          </a:prstGeom>
+        </p:spPr>
+      </p:pic>
+      <p:pic>
+        <p:nvPicPr>
+          <p:cNvPr id="17" name="Picture 16">
+            <a:extLst>
+              <a:ext uri="{FF2B5EF4-FFF2-40B4-BE49-F238E27FC236}">
+                <a16:creationId xmlns:a16="http://schemas.microsoft.com/office/drawing/2014/main" id="{A3441DAE-60F4-4C63-973C-CD5DAEFE6862}"/>
+              </a:ext>
+            </a:extLst>
+          </p:cNvPr>
+          <p:cNvPicPr>
+            <a:picLocks noChangeAspect="1"/>
+          </p:cNvPicPr>
+          <p:nvPr/>
+        </p:nvPicPr>
+        <p:blipFill>
+          <a:blip r:embed="rId5"/>
+          <a:stretch>
+            <a:fillRect/>
+          </a:stretch>
+        </p:blipFill>
+        <p:spPr>
+          <a:xfrm>
+            <a:off x="132056" y="4472663"/>
+            <a:ext cx="4229894" cy="2283721"/>
+          </a:xfrm>
+          <a:prstGeom prst="rect">
+            <a:avLst/>
+          </a:prstGeom>
+        </p:spPr>
+      </p:pic>
+      <p:pic>
+        <p:nvPicPr>
+          <p:cNvPr id="19" name="Picture 18">
+            <a:extLst>
+              <a:ext uri="{FF2B5EF4-FFF2-40B4-BE49-F238E27FC236}">
+                <a16:creationId xmlns:a16="http://schemas.microsoft.com/office/drawing/2014/main" id="{B5169639-FC80-4AAD-8D12-039C98B898B5}"/>
+              </a:ext>
+            </a:extLst>
+          </p:cNvPr>
+          <p:cNvPicPr>
+            <a:picLocks noChangeAspect="1"/>
+          </p:cNvPicPr>
+          <p:nvPr/>
+        </p:nvPicPr>
+        <p:blipFill>
+          <a:blip r:embed="rId6"/>
+          <a:stretch>
+            <a:fillRect/>
+          </a:stretch>
+        </p:blipFill>
+        <p:spPr>
+          <a:xfrm>
+            <a:off x="4782052" y="4462948"/>
+            <a:ext cx="4111124" cy="2327051"/>
           </a:xfrm>
           <a:prstGeom prst="rect">
             <a:avLst/>

</xml_diff>